<commit_message>
modified card image appearance and card width layout in restaurants page
</commit_message>
<xml_diff>
--- a/FOOD DELIVERY APPLICATION.pptx
+++ b/FOOD DELIVERY APPLICATION.pptx
@@ -5,13 +5,14 @@
     <p:sldMasterId id="2147483905" r:id="rId4"/>
   </p:sldMasterIdLst>
   <p:notesMasterIdLst>
-    <p:notesMasterId r:id="rId6"/>
+    <p:notesMasterId r:id="rId7"/>
   </p:notesMasterIdLst>
   <p:handoutMasterIdLst>
-    <p:handoutMasterId r:id="rId7"/>
+    <p:handoutMasterId r:id="rId8"/>
   </p:handoutMasterIdLst>
   <p:sldIdLst>
     <p:sldId id="256" r:id="rId5"/>
+    <p:sldId id="257" r:id="rId6"/>
   </p:sldIdLst>
   <p:sldSz cx="12192000" cy="6858000"/>
   <p:notesSz cx="6858000" cy="9144000"/>
@@ -148,7 +149,7 @@
           <p:cNvPr id="2" name="Header Placeholder 1">
             <a:extLst>
               <a:ext uri="{FF2B5EF4-FFF2-40B4-BE49-F238E27FC236}">
-                <a16:creationId xmlns:a16="http://schemas.microsoft.com/office/drawing/2014/main" xmlns="" id="{D3A62EC2-9403-4E3F-B9EE-AC16CAC60FB6}"/>
+                <a16:creationId xmlns="" xmlns:a16="http://schemas.microsoft.com/office/drawing/2014/main" id="{D3A62EC2-9403-4E3F-B9EE-AC16CAC60FB6}"/>
               </a:ext>
             </a:extLst>
           </p:cNvPr>
@@ -185,7 +186,7 @@
           <p:cNvPr id="3" name="Date Placeholder 2">
             <a:extLst>
               <a:ext uri="{FF2B5EF4-FFF2-40B4-BE49-F238E27FC236}">
-                <a16:creationId xmlns:a16="http://schemas.microsoft.com/office/drawing/2014/main" xmlns="" id="{FE89550C-613B-478E-B802-C73E62852423}"/>
+                <a16:creationId xmlns="" xmlns:a16="http://schemas.microsoft.com/office/drawing/2014/main" id="{FE89550C-613B-478E-B802-C73E62852423}"/>
               </a:ext>
             </a:extLst>
           </p:cNvPr>
@@ -215,7 +216,7 @@
           <a:p>
             <a:fld id="{8369C108-6DA3-45F2-AE7E-50E80854775B}" type="datetimeFigureOut">
               <a:rPr lang="en-US" smtClean="0"/>
-              <a:t>9/15/2023</a:t>
+              <a:t>9/16/2023</a:t>
             </a:fld>
             <a:endParaRPr lang="en-US" dirty="0"/>
           </a:p>
@@ -226,7 +227,7 @@
           <p:cNvPr id="4" name="Footer Placeholder 3">
             <a:extLst>
               <a:ext uri="{FF2B5EF4-FFF2-40B4-BE49-F238E27FC236}">
-                <a16:creationId xmlns:a16="http://schemas.microsoft.com/office/drawing/2014/main" xmlns="" id="{D4013C7E-277B-477F-B8EF-FBEECB8A1FC4}"/>
+                <a16:creationId xmlns="" xmlns:a16="http://schemas.microsoft.com/office/drawing/2014/main" id="{D4013C7E-277B-477F-B8EF-FBEECB8A1FC4}"/>
               </a:ext>
             </a:extLst>
           </p:cNvPr>
@@ -263,7 +264,7 @@
           <p:cNvPr id="5" name="Slide Number Placeholder 4">
             <a:extLst>
               <a:ext uri="{FF2B5EF4-FFF2-40B4-BE49-F238E27FC236}">
-                <a16:creationId xmlns:a16="http://schemas.microsoft.com/office/drawing/2014/main" xmlns="" id="{66496058-9ECC-48B6-8A85-7E3A3E39E823}"/>
+                <a16:creationId xmlns="" xmlns:a16="http://schemas.microsoft.com/office/drawing/2014/main" id="{66496058-9ECC-48B6-8A85-7E3A3E39E823}"/>
               </a:ext>
             </a:extLst>
           </p:cNvPr>
@@ -392,7 +393,7 @@
           <a:p>
             <a:fld id="{476A73B2-5605-4CC4-ADC6-622651651079}" type="datetimeFigureOut">
               <a:rPr lang="en-US" smtClean="0"/>
-              <a:t>9/15/2023</a:t>
+              <a:t>9/16/2023</a:t>
             </a:fld>
             <a:endParaRPr lang="en-US" dirty="0"/>
           </a:p>
@@ -829,7 +830,7 @@
           <a:p>
             <a:fld id="{9AB3A824-1A51-4B26-AD58-A6D8E14F6C04}" type="datetimeFigureOut">
               <a:rPr lang="en-US" smtClean="0"/>
-              <a:t>9/15/2023</a:t>
+              <a:t>9/16/2023</a:t>
             </a:fld>
             <a:endParaRPr lang="en-US" dirty="0"/>
           </a:p>
@@ -1101,7 +1102,7 @@
           <a:p>
             <a:fld id="{3CBC1C18-307B-4F68-A007-B5B542270E8D}" type="datetimeFigureOut">
               <a:rPr lang="en-US" smtClean="0"/>
-              <a:t>9/15/2023</a:t>
+              <a:t>9/16/2023</a:t>
             </a:fld>
             <a:endParaRPr lang="en-US" dirty="0"/>
           </a:p>
@@ -1339,7 +1340,7 @@
           <a:p>
             <a:fld id="{3CBC1C18-307B-4F68-A007-B5B542270E8D}" type="datetimeFigureOut">
               <a:rPr lang="en-US" smtClean="0"/>
-              <a:t>9/15/2023</a:t>
+              <a:t>9/16/2023</a:t>
             </a:fld>
             <a:endParaRPr lang="en-US" dirty="0"/>
           </a:p>
@@ -1656,7 +1657,7 @@
           <a:p>
             <a:fld id="{3CBC1C18-307B-4F68-A007-B5B542270E8D}" type="datetimeFigureOut">
               <a:rPr lang="en-US" smtClean="0"/>
-              <a:t>9/15/2023</a:t>
+              <a:t>9/16/2023</a:t>
             </a:fld>
             <a:endParaRPr lang="en-US" dirty="0"/>
           </a:p>
@@ -2136,7 +2137,7 @@
           <a:p>
             <a:fld id="{3CBC1C18-307B-4F68-A007-B5B542270E8D}" type="datetimeFigureOut">
               <a:rPr lang="en-US" smtClean="0"/>
-              <a:t>9/15/2023</a:t>
+              <a:t>9/16/2023</a:t>
             </a:fld>
             <a:endParaRPr lang="en-US" dirty="0"/>
           </a:p>
@@ -2690,7 +2691,7 @@
           <a:p>
             <a:fld id="{3CBC1C18-307B-4F68-A007-B5B542270E8D}" type="datetimeFigureOut">
               <a:rPr lang="en-US" smtClean="0"/>
-              <a:t>9/15/2023</a:t>
+              <a:t>9/16/2023</a:t>
             </a:fld>
             <a:endParaRPr lang="en-US" dirty="0"/>
           </a:p>
@@ -3471,7 +3472,7 @@
           <a:p>
             <a:fld id="{3CBC1C18-307B-4F68-A007-B5B542270E8D}" type="datetimeFigureOut">
               <a:rPr lang="en-US" smtClean="0"/>
-              <a:t>9/15/2023</a:t>
+              <a:t>9/16/2023</a:t>
             </a:fld>
             <a:endParaRPr lang="en-US" dirty="0"/>
           </a:p>
@@ -3653,7 +3654,7 @@
           <a:p>
             <a:fld id="{D857E33E-8B18-4087-B112-809917729534}" type="datetimeFigureOut">
               <a:rPr lang="en-US" smtClean="0"/>
-              <a:t>9/15/2023</a:t>
+              <a:t>9/16/2023</a:t>
             </a:fld>
             <a:endParaRPr lang="en-US" dirty="0"/>
           </a:p>
@@ -3881,7 +3882,7 @@
           <a:p>
             <a:fld id="{D3FFE419-2371-464F-8239-3959401C3561}" type="datetimeFigureOut">
               <a:rPr lang="en-US" smtClean="0"/>
-              <a:t>9/15/2023</a:t>
+              <a:t>9/16/2023</a:t>
             </a:fld>
             <a:endParaRPr lang="en-US" dirty="0"/>
           </a:p>
@@ -4066,7 +4067,7 @@
           <a:p>
             <a:fld id="{97D162C4-EDD9-4389-A98B-B87ECEA2A816}" type="datetimeFigureOut">
               <a:rPr lang="en-US" smtClean="0"/>
-              <a:t>9/15/2023</a:t>
+              <a:t>9/16/2023</a:t>
             </a:fld>
             <a:endParaRPr lang="en-US" dirty="0"/>
           </a:p>
@@ -4360,7 +4361,7 @@
           <a:p>
             <a:fld id="{3E5059C3-6A89-4494-99FF-5A4D6FFD50EB}" type="datetimeFigureOut">
               <a:rPr lang="en-US" smtClean="0"/>
-              <a:t>9/15/2023</a:t>
+              <a:t>9/16/2023</a:t>
             </a:fld>
             <a:endParaRPr lang="en-US" dirty="0"/>
           </a:p>
@@ -4607,7 +4608,7 @@
           <a:p>
             <a:fld id="{CA954B2F-12DE-47F5-8894-472B206D2E1E}" type="datetimeFigureOut">
               <a:rPr lang="en-US" smtClean="0"/>
-              <a:t>9/15/2023</a:t>
+              <a:t>9/16/2023</a:t>
             </a:fld>
             <a:endParaRPr lang="en-US" dirty="0"/>
           </a:p>
@@ -4991,7 +4992,7 @@
           <a:p>
             <a:fld id="{3CBC1C18-307B-4F68-A007-B5B542270E8D}" type="datetimeFigureOut">
               <a:rPr lang="en-US" smtClean="0"/>
-              <a:t>9/15/2023</a:t>
+              <a:t>9/16/2023</a:t>
             </a:fld>
             <a:endParaRPr lang="en-US" dirty="0"/>
           </a:p>
@@ -5116,7 +5117,7 @@
           <a:p>
             <a:fld id="{1FAF3416-4057-4DAA-829D-4CA07428D088}" type="datetimeFigureOut">
               <a:rPr lang="en-US" smtClean="0"/>
-              <a:t>9/15/2023</a:t>
+              <a:t>9/16/2023</a:t>
             </a:fld>
             <a:endParaRPr lang="en-US" dirty="0"/>
           </a:p>
@@ -5216,7 +5217,7 @@
           <a:p>
             <a:fld id="{921D9284-D300-4297-87F7-E791DCC15DB1}" type="datetimeFigureOut">
               <a:rPr lang="en-US" smtClean="0"/>
-              <a:t>9/15/2023</a:t>
+              <a:t>9/16/2023</a:t>
             </a:fld>
             <a:endParaRPr lang="en-US" dirty="0"/>
           </a:p>
@@ -5470,7 +5471,7 @@
           <a:p>
             <a:fld id="{37D525BB-DA17-4BA0-B3C8-3AC3ABC827E6}" type="datetimeFigureOut">
               <a:rPr lang="en-US" smtClean="0"/>
-              <a:t>9/15/2023</a:t>
+              <a:t>9/16/2023</a:t>
             </a:fld>
             <a:endParaRPr lang="en-US" dirty="0"/>
           </a:p>
@@ -5732,7 +5733,7 @@
           <a:p>
             <a:fld id="{B16C4C9A-3960-41CF-A4E9-2A8FB932454B}" type="datetimeFigureOut">
               <a:rPr lang="en-US" smtClean="0"/>
-              <a:t>9/15/2023</a:t>
+              <a:t>9/16/2023</a:t>
             </a:fld>
             <a:endParaRPr lang="en-US" dirty="0"/>
           </a:p>
@@ -5980,7 +5981,7 @@
           <a:p>
             <a:fld id="{3CBC1C18-307B-4F68-A007-B5B542270E8D}" type="datetimeFigureOut">
               <a:rPr lang="en-US" smtClean="0"/>
-              <a:t>9/15/2023</a:t>
+              <a:t>9/16/2023</a:t>
             </a:fld>
             <a:endParaRPr lang="en-US" dirty="0"/>
           </a:p>
@@ -6465,10 +6466,7 @@
           </a:bodyPr>
           <a:lstStyle/>
           <a:p>
-            <a:pPr marL="342900" indent="-342900" algn="ctr">
-              <a:buFontTx/>
-              <a:buChar char="-"/>
-            </a:pPr>
+            <a:pPr algn="ctr"/>
             <a:r>
               <a:rPr lang="en-US" dirty="0" smtClean="0"/>
               <a:t>Prepared By</a:t>
@@ -6499,6 +6497,169 @@
     <p:extLst>
       <p:ext uri="{BB962C8B-B14F-4D97-AF65-F5344CB8AC3E}">
         <p14:creationId xmlns:p14="http://schemas.microsoft.com/office/powerpoint/2010/main" val="63663608"/>
+      </p:ext>
+    </p:extLst>
+  </p:cSld>
+  <p:clrMapOvr>
+    <a:masterClrMapping/>
+  </p:clrMapOvr>
+</p:sld>
+</file>
+
+<file path=ppt/slides/slide2.xml><?xml version="1.0" encoding="utf-8"?>
+<p:sld xmlns:a="http://schemas.openxmlformats.org/drawingml/2006/main" xmlns:r="http://schemas.openxmlformats.org/officeDocument/2006/relationships" xmlns:p="http://schemas.openxmlformats.org/presentationml/2006/main">
+  <p:cSld>
+    <p:spTree>
+      <p:nvGrpSpPr>
+        <p:cNvPr id="1" name=""/>
+        <p:cNvGrpSpPr/>
+        <p:nvPr/>
+      </p:nvGrpSpPr>
+      <p:grpSpPr>
+        <a:xfrm>
+          <a:off x="0" y="0"/>
+          <a:ext cx="0" cy="0"/>
+          <a:chOff x="0" y="0"/>
+          <a:chExt cx="0" cy="0"/>
+        </a:xfrm>
+      </p:grpSpPr>
+      <p:sp>
+        <p:nvSpPr>
+          <p:cNvPr id="2" name="Title 1"/>
+          <p:cNvSpPr>
+            <a:spLocks noGrp="1"/>
+          </p:cNvSpPr>
+          <p:nvPr>
+            <p:ph type="title"/>
+          </p:nvPr>
+        </p:nvSpPr>
+        <p:spPr/>
+        <p:txBody>
+          <a:bodyPr/>
+          <a:lstStyle/>
+          <a:p>
+            <a:endParaRPr lang="en-IN"/>
+          </a:p>
+        </p:txBody>
+      </p:sp>
+      <p:sp>
+        <p:nvSpPr>
+          <p:cNvPr id="3" name="Text Placeholder 2"/>
+          <p:cNvSpPr>
+            <a:spLocks noGrp="1"/>
+          </p:cNvSpPr>
+          <p:nvPr>
+            <p:ph type="body" idx="1"/>
+          </p:nvPr>
+        </p:nvSpPr>
+        <p:spPr/>
+        <p:txBody>
+          <a:bodyPr/>
+          <a:lstStyle/>
+          <a:p>
+            <a:endParaRPr lang="en-IN"/>
+          </a:p>
+        </p:txBody>
+      </p:sp>
+      <p:sp>
+        <p:nvSpPr>
+          <p:cNvPr id="4" name="Text Placeholder 3"/>
+          <p:cNvSpPr>
+            <a:spLocks noGrp="1"/>
+          </p:cNvSpPr>
+          <p:nvPr>
+            <p:ph type="body" sz="half" idx="15"/>
+          </p:nvPr>
+        </p:nvSpPr>
+        <p:spPr/>
+        <p:txBody>
+          <a:bodyPr/>
+          <a:lstStyle/>
+          <a:p>
+            <a:endParaRPr lang="en-IN"/>
+          </a:p>
+        </p:txBody>
+      </p:sp>
+      <p:sp>
+        <p:nvSpPr>
+          <p:cNvPr id="5" name="Text Placeholder 4"/>
+          <p:cNvSpPr>
+            <a:spLocks noGrp="1"/>
+          </p:cNvSpPr>
+          <p:nvPr>
+            <p:ph type="body" sz="quarter" idx="3"/>
+          </p:nvPr>
+        </p:nvSpPr>
+        <p:spPr/>
+        <p:txBody>
+          <a:bodyPr/>
+          <a:lstStyle/>
+          <a:p>
+            <a:endParaRPr lang="en-IN"/>
+          </a:p>
+        </p:txBody>
+      </p:sp>
+      <p:sp>
+        <p:nvSpPr>
+          <p:cNvPr id="6" name="Text Placeholder 5"/>
+          <p:cNvSpPr>
+            <a:spLocks noGrp="1"/>
+          </p:cNvSpPr>
+          <p:nvPr>
+            <p:ph type="body" sz="half" idx="16"/>
+          </p:nvPr>
+        </p:nvSpPr>
+        <p:spPr/>
+        <p:txBody>
+          <a:bodyPr/>
+          <a:lstStyle/>
+          <a:p>
+            <a:endParaRPr lang="en-IN"/>
+          </a:p>
+        </p:txBody>
+      </p:sp>
+      <p:sp>
+        <p:nvSpPr>
+          <p:cNvPr id="7" name="Text Placeholder 6"/>
+          <p:cNvSpPr>
+            <a:spLocks noGrp="1"/>
+          </p:cNvSpPr>
+          <p:nvPr>
+            <p:ph type="body" sz="quarter" idx="13"/>
+          </p:nvPr>
+        </p:nvSpPr>
+        <p:spPr/>
+        <p:txBody>
+          <a:bodyPr/>
+          <a:lstStyle/>
+          <a:p>
+            <a:endParaRPr lang="en-IN"/>
+          </a:p>
+        </p:txBody>
+      </p:sp>
+      <p:sp>
+        <p:nvSpPr>
+          <p:cNvPr id="8" name="Text Placeholder 7"/>
+          <p:cNvSpPr>
+            <a:spLocks noGrp="1"/>
+          </p:cNvSpPr>
+          <p:nvPr>
+            <p:ph type="body" sz="half" idx="17"/>
+          </p:nvPr>
+        </p:nvSpPr>
+        <p:spPr/>
+        <p:txBody>
+          <a:bodyPr/>
+          <a:lstStyle/>
+          <a:p>
+            <a:endParaRPr lang="en-IN"/>
+          </a:p>
+        </p:txBody>
+      </p:sp>
+    </p:spTree>
+    <p:extLst>
+      <p:ext uri="{BB962C8B-B14F-4D97-AF65-F5344CB8AC3E}">
+        <p14:creationId xmlns:p14="http://schemas.microsoft.com/office/powerpoint/2010/main" val="1843758970"/>
       </p:ext>
     </p:extLst>
   </p:cSld>
@@ -7369,24 +7530,6 @@
 </file>
 
 <file path=customXml/item1.xml><?xml version="1.0" encoding="utf-8"?>
-<p:properties xmlns:p="http://schemas.microsoft.com/office/2006/metadata/properties" xmlns:xsi="http://www.w3.org/2001/XMLSchema-instance" xmlns:pc="http://schemas.microsoft.com/office/infopath/2007/PartnerControls">
-  <documentManagement>
-    <MediaServiceKeyPoints xmlns="71af3243-3dd4-4a8d-8c0d-dd76da1f02a5" xsi:nil="true"/>
-    <Status xmlns="71af3243-3dd4-4a8d-8c0d-dd76da1f02a5">Not started</Status>
-  </documentManagement>
-</p:properties>
-</file>
-
-<file path=customXml/item2.xml><?xml version="1.0" encoding="utf-8"?>
-<?mso-contentType ?>
-<FormTemplates xmlns="http://schemas.microsoft.com/sharepoint/v3/contenttype/forms">
-  <Display>DocumentLibraryForm</Display>
-  <Edit>DocumentLibraryForm</Edit>
-  <New>DocumentLibraryForm</New>
-</FormTemplates>
-</file>
-
-<file path=customXml/item3.xml><?xml version="1.0" encoding="utf-8"?>
 <ct:contentTypeSchema xmlns:ct="http://schemas.microsoft.com/office/2006/metadata/contentType" xmlns:ma="http://schemas.microsoft.com/office/2006/metadata/properties/metaAttributes" ct:_="" ma:_="" ma:contentTypeName="Document" ma:contentTypeID="0x01010079F111ED35F8CC479449609E8A0923A6" ma:contentTypeVersion="12" ma:contentTypeDescription="Create a new document." ma:contentTypeScope="" ma:versionID="b385d60f68dd989dca1fdc827799d853">
   <xsd:schema xmlns:xsd="http://www.w3.org/2001/XMLSchema" xmlns:xs="http://www.w3.org/2001/XMLSchema" xmlns:p="http://schemas.microsoft.com/office/2006/metadata/properties" xmlns:ns2="71af3243-3dd4-4a8d-8c0d-dd76da1f02a5" xmlns:ns3="16c05727-aa75-4e4a-9b5f-8a80a1165891" targetNamespace="http://schemas.microsoft.com/office/2006/metadata/properties" ma:root="true" ma:fieldsID="1911b479caf7b199da365455750e4572" ns2:_="" ns3:_="">
     <xsd:import namespace="71af3243-3dd4-4a8d-8c0d-dd76da1f02a5"/>
@@ -7607,32 +7750,25 @@
 </ct:contentTypeSchema>
 </file>
 
-<file path=customXml/itemProps1.xml><?xml version="1.0" encoding="utf-8"?>
-<ds:datastoreItem xmlns:ds="http://schemas.openxmlformats.org/officeDocument/2006/customXml" ds:itemID="{69E38AEF-4E2D-4D00-9707-4356DDB77317}">
-  <ds:schemaRefs>
-    <ds:schemaRef ds:uri="http://purl.org/dc/terms/"/>
-    <ds:schemaRef ds:uri="71af3243-3dd4-4a8d-8c0d-dd76da1f02a5"/>
-    <ds:schemaRef ds:uri="16c05727-aa75-4e4a-9b5f-8a80a1165891"/>
-    <ds:schemaRef ds:uri="http://www.w3.org/XML/1998/namespace"/>
-    <ds:schemaRef ds:uri="http://schemas.microsoft.com/office/2006/documentManagement/types"/>
-    <ds:schemaRef ds:uri="http://schemas.microsoft.com/office/2006/metadata/properties"/>
-    <ds:schemaRef ds:uri="http://schemas.microsoft.com/office/infopath/2007/PartnerControls"/>
-    <ds:schemaRef ds:uri="http://purl.org/dc/dcmitype/"/>
-    <ds:schemaRef ds:uri="http://schemas.openxmlformats.org/package/2006/metadata/core-properties"/>
-    <ds:schemaRef ds:uri="http://purl.org/dc/elements/1.1/"/>
-  </ds:schemaRefs>
-</ds:datastoreItem>
+<file path=customXml/item2.xml><?xml version="1.0" encoding="utf-8"?>
+<?mso-contentType ?>
+<FormTemplates xmlns="http://schemas.microsoft.com/sharepoint/v3/contenttype/forms">
+  <Display>DocumentLibraryForm</Display>
+  <Edit>DocumentLibraryForm</Edit>
+  <New>DocumentLibraryForm</New>
+</FormTemplates>
 </file>
 
-<file path=customXml/itemProps2.xml><?xml version="1.0" encoding="utf-8"?>
-<ds:datastoreItem xmlns:ds="http://schemas.openxmlformats.org/officeDocument/2006/customXml" ds:itemID="{E7235C91-959C-45D9-B60A-005B894ACEE3}">
-  <ds:schemaRefs>
-    <ds:schemaRef ds:uri="http://schemas.microsoft.com/sharepoint/v3/contenttype/forms"/>
-  </ds:schemaRefs>
-</ds:datastoreItem>
+<file path=customXml/item3.xml><?xml version="1.0" encoding="utf-8"?>
+<p:properties xmlns:p="http://schemas.microsoft.com/office/2006/metadata/properties" xmlns:xsi="http://www.w3.org/2001/XMLSchema-instance" xmlns:pc="http://schemas.microsoft.com/office/infopath/2007/PartnerControls">
+  <documentManagement>
+    <MediaServiceKeyPoints xmlns="71af3243-3dd4-4a8d-8c0d-dd76da1f02a5" xsi:nil="true"/>
+    <Status xmlns="71af3243-3dd4-4a8d-8c0d-dd76da1f02a5">Not started</Status>
+  </documentManagement>
+</p:properties>
 </file>
 
-<file path=customXml/itemProps3.xml><?xml version="1.0" encoding="utf-8"?>
+<file path=customXml/itemProps1.xml><?xml version="1.0" encoding="utf-8"?>
 <ds:datastoreItem xmlns:ds="http://schemas.openxmlformats.org/officeDocument/2006/customXml" ds:itemID="{1EF06AFC-006B-4BB6-8B59-5A9E1B0534F1}">
   <ds:schemaRefs>
     <ds:schemaRef ds:uri="http://schemas.microsoft.com/office/2006/metadata/contentType"/>
@@ -7649,4 +7785,29 @@
     <ds:schemaRef ds:uri="http://schemas.microsoft.com/internal/obd"/>
   </ds:schemaRefs>
 </ds:datastoreItem>
+</file>
+
+<file path=customXml/itemProps2.xml><?xml version="1.0" encoding="utf-8"?>
+<ds:datastoreItem xmlns:ds="http://schemas.openxmlformats.org/officeDocument/2006/customXml" ds:itemID="{E7235C91-959C-45D9-B60A-005B894ACEE3}">
+  <ds:schemaRefs>
+    <ds:schemaRef ds:uri="http://schemas.microsoft.com/sharepoint/v3/contenttype/forms"/>
+  </ds:schemaRefs>
+</ds:datastoreItem>
+</file>
+
+<file path=customXml/itemProps3.xml><?xml version="1.0" encoding="utf-8"?>
+<ds:datastoreItem xmlns:ds="http://schemas.openxmlformats.org/officeDocument/2006/customXml" ds:itemID="{69E38AEF-4E2D-4D00-9707-4356DDB77317}">
+  <ds:schemaRefs>
+    <ds:schemaRef ds:uri="http://purl.org/dc/terms/"/>
+    <ds:schemaRef ds:uri="71af3243-3dd4-4a8d-8c0d-dd76da1f02a5"/>
+    <ds:schemaRef ds:uri="16c05727-aa75-4e4a-9b5f-8a80a1165891"/>
+    <ds:schemaRef ds:uri="http://www.w3.org/XML/1998/namespace"/>
+    <ds:schemaRef ds:uri="http://schemas.microsoft.com/office/2006/documentManagement/types"/>
+    <ds:schemaRef ds:uri="http://schemas.microsoft.com/office/2006/metadata/properties"/>
+    <ds:schemaRef ds:uri="http://schemas.microsoft.com/office/infopath/2007/PartnerControls"/>
+    <ds:schemaRef ds:uri="http://purl.org/dc/dcmitype/"/>
+    <ds:schemaRef ds:uri="http://schemas.openxmlformats.org/package/2006/metadata/core-properties"/>
+    <ds:schemaRef ds:uri="http://purl.org/dc/elements/1.1/"/>
+  </ds:schemaRefs>
+</ds:datastoreItem>
 </file>
</xml_diff>

<commit_message>
worked on project ppt
</commit_message>
<xml_diff>
--- a/FOOD DELIVERY APPLICATION.pptx
+++ b/FOOD DELIVERY APPLICATION.pptx
@@ -5,14 +5,25 @@
     <p:sldMasterId id="2147483905" r:id="rId4"/>
   </p:sldMasterIdLst>
   <p:notesMasterIdLst>
-    <p:notesMasterId r:id="rId7"/>
+    <p:notesMasterId r:id="rId18"/>
   </p:notesMasterIdLst>
   <p:handoutMasterIdLst>
-    <p:handoutMasterId r:id="rId8"/>
+    <p:handoutMasterId r:id="rId19"/>
   </p:handoutMasterIdLst>
   <p:sldIdLst>
     <p:sldId id="256" r:id="rId5"/>
-    <p:sldId id="257" r:id="rId6"/>
+    <p:sldId id="258" r:id="rId6"/>
+    <p:sldId id="259" r:id="rId7"/>
+    <p:sldId id="260" r:id="rId8"/>
+    <p:sldId id="261" r:id="rId9"/>
+    <p:sldId id="262" r:id="rId10"/>
+    <p:sldId id="263" r:id="rId11"/>
+    <p:sldId id="264" r:id="rId12"/>
+    <p:sldId id="265" r:id="rId13"/>
+    <p:sldId id="266" r:id="rId14"/>
+    <p:sldId id="267" r:id="rId15"/>
+    <p:sldId id="268" r:id="rId16"/>
+    <p:sldId id="269" r:id="rId17"/>
   </p:sldIdLst>
   <p:sldSz cx="12192000" cy="6858000"/>
   <p:notesSz cx="6858000" cy="9144000"/>
@@ -149,7 +160,7 @@
           <p:cNvPr id="2" name="Header Placeholder 1">
             <a:extLst>
               <a:ext uri="{FF2B5EF4-FFF2-40B4-BE49-F238E27FC236}">
-                <a16:creationId xmlns="" xmlns:a16="http://schemas.microsoft.com/office/drawing/2014/main" id="{D3A62EC2-9403-4E3F-B9EE-AC16CAC60FB6}"/>
+                <a16:creationId xmlns:a16="http://schemas.microsoft.com/office/drawing/2014/main" xmlns="" id="{D3A62EC2-9403-4E3F-B9EE-AC16CAC60FB6}"/>
               </a:ext>
             </a:extLst>
           </p:cNvPr>
@@ -186,7 +197,7 @@
           <p:cNvPr id="3" name="Date Placeholder 2">
             <a:extLst>
               <a:ext uri="{FF2B5EF4-FFF2-40B4-BE49-F238E27FC236}">
-                <a16:creationId xmlns="" xmlns:a16="http://schemas.microsoft.com/office/drawing/2014/main" id="{FE89550C-613B-478E-B802-C73E62852423}"/>
+                <a16:creationId xmlns:a16="http://schemas.microsoft.com/office/drawing/2014/main" xmlns="" id="{FE89550C-613B-478E-B802-C73E62852423}"/>
               </a:ext>
             </a:extLst>
           </p:cNvPr>
@@ -227,7 +238,7 @@
           <p:cNvPr id="4" name="Footer Placeholder 3">
             <a:extLst>
               <a:ext uri="{FF2B5EF4-FFF2-40B4-BE49-F238E27FC236}">
-                <a16:creationId xmlns="" xmlns:a16="http://schemas.microsoft.com/office/drawing/2014/main" id="{D4013C7E-277B-477F-B8EF-FBEECB8A1FC4}"/>
+                <a16:creationId xmlns:a16="http://schemas.microsoft.com/office/drawing/2014/main" xmlns="" id="{D4013C7E-277B-477F-B8EF-FBEECB8A1FC4}"/>
               </a:ext>
             </a:extLst>
           </p:cNvPr>
@@ -264,7 +275,7 @@
           <p:cNvPr id="5" name="Slide Number Placeholder 4">
             <a:extLst>
               <a:ext uri="{FF2B5EF4-FFF2-40B4-BE49-F238E27FC236}">
-                <a16:creationId xmlns="" xmlns:a16="http://schemas.microsoft.com/office/drawing/2014/main" id="{66496058-9ECC-48B6-8A85-7E3A3E39E823}"/>
+                <a16:creationId xmlns:a16="http://schemas.microsoft.com/office/drawing/2014/main" xmlns="" id="{66496058-9ECC-48B6-8A85-7E3A3E39E823}"/>
               </a:ext>
             </a:extLst>
           </p:cNvPr>
@@ -6503,6 +6514,572 @@
   <p:clrMapOvr>
     <a:masterClrMapping/>
   </p:clrMapOvr>
+  <p:timing>
+    <p:tnLst>
+      <p:par>
+        <p:cTn id="1" dur="indefinite" restart="never" nodeType="tmRoot"/>
+      </p:par>
+    </p:tnLst>
+  </p:timing>
+</p:sld>
+</file>
+
+<file path=ppt/slides/slide10.xml><?xml version="1.0" encoding="utf-8"?>
+<p:sld xmlns:a="http://schemas.openxmlformats.org/drawingml/2006/main" xmlns:r="http://schemas.openxmlformats.org/officeDocument/2006/relationships" xmlns:p="http://schemas.openxmlformats.org/presentationml/2006/main">
+  <p:cSld>
+    <p:spTree>
+      <p:nvGrpSpPr>
+        <p:cNvPr id="1" name=""/>
+        <p:cNvGrpSpPr/>
+        <p:nvPr/>
+      </p:nvGrpSpPr>
+      <p:grpSpPr>
+        <a:xfrm>
+          <a:off x="0" y="0"/>
+          <a:ext cx="0" cy="0"/>
+          <a:chOff x="0" y="0"/>
+          <a:chExt cx="0" cy="0"/>
+        </a:xfrm>
+      </p:grpSpPr>
+      <p:sp>
+        <p:nvSpPr>
+          <p:cNvPr id="2" name="Title 1"/>
+          <p:cNvSpPr>
+            <a:spLocks noGrp="1"/>
+          </p:cNvSpPr>
+          <p:nvPr>
+            <p:ph type="title"/>
+          </p:nvPr>
+        </p:nvSpPr>
+        <p:spPr/>
+        <p:txBody>
+          <a:bodyPr/>
+          <a:lstStyle/>
+          <a:p>
+            <a:r>
+              <a:rPr lang="en-US" dirty="0" smtClean="0"/>
+              <a:t>EUREKA SERVER</a:t>
+            </a:r>
+            <a:endParaRPr lang="en-IN" dirty="0"/>
+          </a:p>
+        </p:txBody>
+      </p:sp>
+      <p:sp>
+        <p:nvSpPr>
+          <p:cNvPr id="3" name="Content Placeholder 2"/>
+          <p:cNvSpPr>
+            <a:spLocks noGrp="1"/>
+          </p:cNvSpPr>
+          <p:nvPr>
+            <p:ph sz="half" idx="1"/>
+          </p:nvPr>
+        </p:nvSpPr>
+        <p:spPr/>
+        <p:txBody>
+          <a:bodyPr/>
+          <a:lstStyle/>
+          <a:p>
+            <a:endParaRPr lang="en-IN"/>
+          </a:p>
+        </p:txBody>
+      </p:sp>
+      <p:pic>
+        <p:nvPicPr>
+          <p:cNvPr id="5" name="Content Placeholder 4"/>
+          <p:cNvPicPr>
+            <a:picLocks noGrp="1" noChangeAspect="1"/>
+          </p:cNvPicPr>
+          <p:nvPr>
+            <p:ph sz="half" idx="2"/>
+          </p:nvPr>
+        </p:nvPicPr>
+        <p:blipFill>
+          <a:blip r:embed="rId2">
+            <a:extLst>
+              <a:ext uri="{28A0092B-C50C-407E-A947-70E740481C1C}">
+                <a14:useLocalDpi xmlns:a14="http://schemas.microsoft.com/office/drawing/2010/main" val="0"/>
+              </a:ext>
+            </a:extLst>
+          </a:blip>
+          <a:stretch>
+            <a:fillRect/>
+          </a:stretch>
+        </p:blipFill>
+        <p:spPr>
+          <a:xfrm>
+            <a:off x="6172200" y="2194559"/>
+            <a:ext cx="6019800" cy="4335030"/>
+          </a:xfrm>
+        </p:spPr>
+      </p:pic>
+    </p:spTree>
+    <p:extLst>
+      <p:ext uri="{BB962C8B-B14F-4D97-AF65-F5344CB8AC3E}">
+        <p14:creationId xmlns:p14="http://schemas.microsoft.com/office/powerpoint/2010/main" val="649098864"/>
+      </p:ext>
+    </p:extLst>
+  </p:cSld>
+  <p:clrMapOvr>
+    <a:masterClrMapping/>
+  </p:clrMapOvr>
+  <p:timing>
+    <p:tnLst>
+      <p:par>
+        <p:cTn id="1" dur="indefinite" restart="never" nodeType="tmRoot"/>
+      </p:par>
+    </p:tnLst>
+  </p:timing>
+</p:sld>
+</file>
+
+<file path=ppt/slides/slide11.xml><?xml version="1.0" encoding="utf-8"?>
+<p:sld xmlns:a="http://schemas.openxmlformats.org/drawingml/2006/main" xmlns:r="http://schemas.openxmlformats.org/officeDocument/2006/relationships" xmlns:p="http://schemas.openxmlformats.org/presentationml/2006/main">
+  <p:cSld>
+    <p:spTree>
+      <p:nvGrpSpPr>
+        <p:cNvPr id="1" name=""/>
+        <p:cNvGrpSpPr/>
+        <p:nvPr/>
+      </p:nvGrpSpPr>
+      <p:grpSpPr>
+        <a:xfrm>
+          <a:off x="0" y="0"/>
+          <a:ext cx="0" cy="0"/>
+          <a:chOff x="0" y="0"/>
+          <a:chExt cx="0" cy="0"/>
+        </a:xfrm>
+      </p:grpSpPr>
+      <p:sp>
+        <p:nvSpPr>
+          <p:cNvPr id="2" name="Title 1"/>
+          <p:cNvSpPr>
+            <a:spLocks noGrp="1"/>
+          </p:cNvSpPr>
+          <p:nvPr>
+            <p:ph type="title"/>
+          </p:nvPr>
+        </p:nvSpPr>
+        <p:spPr/>
+        <p:txBody>
+          <a:bodyPr/>
+          <a:lstStyle/>
+          <a:p>
+            <a:r>
+              <a:rPr lang="en-US" dirty="0" smtClean="0"/>
+              <a:t>API GATEWAY</a:t>
+            </a:r>
+            <a:endParaRPr lang="en-IN" dirty="0"/>
+          </a:p>
+        </p:txBody>
+      </p:sp>
+      <p:sp>
+        <p:nvSpPr>
+          <p:cNvPr id="3" name="Content Placeholder 2"/>
+          <p:cNvSpPr>
+            <a:spLocks noGrp="1"/>
+          </p:cNvSpPr>
+          <p:nvPr>
+            <p:ph sz="half" idx="1"/>
+          </p:nvPr>
+        </p:nvSpPr>
+        <p:spPr/>
+        <p:txBody>
+          <a:bodyPr/>
+          <a:lstStyle/>
+          <a:p>
+            <a:endParaRPr lang="en-IN"/>
+          </a:p>
+        </p:txBody>
+      </p:sp>
+      <p:sp>
+        <p:nvSpPr>
+          <p:cNvPr id="6" name="Content Placeholder 5"/>
+          <p:cNvSpPr>
+            <a:spLocks noGrp="1"/>
+          </p:cNvSpPr>
+          <p:nvPr>
+            <p:ph sz="half" idx="2"/>
+          </p:nvPr>
+        </p:nvSpPr>
+        <p:spPr/>
+        <p:txBody>
+          <a:bodyPr/>
+          <a:lstStyle/>
+          <a:p>
+            <a:endParaRPr lang="en-IN"/>
+          </a:p>
+        </p:txBody>
+      </p:sp>
+    </p:spTree>
+    <p:extLst>
+      <p:ext uri="{BB962C8B-B14F-4D97-AF65-F5344CB8AC3E}">
+        <p14:creationId xmlns:p14="http://schemas.microsoft.com/office/powerpoint/2010/main" val="3988913456"/>
+      </p:ext>
+    </p:extLst>
+  </p:cSld>
+  <p:clrMapOvr>
+    <a:masterClrMapping/>
+  </p:clrMapOvr>
+  <p:timing>
+    <p:tnLst>
+      <p:par>
+        <p:cTn id="1" dur="indefinite" restart="never" nodeType="tmRoot"/>
+      </p:par>
+    </p:tnLst>
+  </p:timing>
+</p:sld>
+</file>
+
+<file path=ppt/slides/slide12.xml><?xml version="1.0" encoding="utf-8"?>
+<p:sld xmlns:a="http://schemas.openxmlformats.org/drawingml/2006/main" xmlns:r="http://schemas.openxmlformats.org/officeDocument/2006/relationships" xmlns:p="http://schemas.openxmlformats.org/presentationml/2006/main">
+  <p:cSld>
+    <p:spTree>
+      <p:nvGrpSpPr>
+        <p:cNvPr id="1" name=""/>
+        <p:cNvGrpSpPr/>
+        <p:nvPr/>
+      </p:nvGrpSpPr>
+      <p:grpSpPr>
+        <a:xfrm>
+          <a:off x="0" y="0"/>
+          <a:ext cx="0" cy="0"/>
+          <a:chOff x="0" y="0"/>
+          <a:chExt cx="0" cy="0"/>
+        </a:xfrm>
+      </p:grpSpPr>
+      <p:sp>
+        <p:nvSpPr>
+          <p:cNvPr id="2" name="Title 1"/>
+          <p:cNvSpPr>
+            <a:spLocks noGrp="1"/>
+          </p:cNvSpPr>
+          <p:nvPr>
+            <p:ph type="title"/>
+          </p:nvPr>
+        </p:nvSpPr>
+        <p:spPr/>
+        <p:txBody>
+          <a:bodyPr/>
+          <a:lstStyle/>
+          <a:p>
+            <a:r>
+              <a:rPr lang="en-US" dirty="0" smtClean="0"/>
+              <a:t>FRONT-END MODULE</a:t>
+            </a:r>
+            <a:endParaRPr lang="en-IN" dirty="0"/>
+          </a:p>
+        </p:txBody>
+      </p:sp>
+      <p:sp>
+        <p:nvSpPr>
+          <p:cNvPr id="3" name="Content Placeholder 2"/>
+          <p:cNvSpPr>
+            <a:spLocks noGrp="1"/>
+          </p:cNvSpPr>
+          <p:nvPr>
+            <p:ph idx="1"/>
+          </p:nvPr>
+        </p:nvSpPr>
+        <p:spPr/>
+        <p:txBody>
+          <a:bodyPr/>
+          <a:lstStyle/>
+          <a:p>
+            <a:r>
+              <a:rPr lang="en-US" dirty="0"/>
+              <a:t>Developed by using Angular, a free web based JS framework</a:t>
+            </a:r>
+          </a:p>
+          <a:p>
+            <a:r>
+              <a:rPr lang="en-US" dirty="0"/>
+              <a:t>Angular is primarily used to develop Single Page Applications (SPA)</a:t>
+            </a:r>
+          </a:p>
+          <a:p>
+            <a:pPr marL="0" indent="0">
+              <a:buNone/>
+            </a:pPr>
+            <a:endParaRPr lang="en-US" dirty="0" smtClean="0"/>
+          </a:p>
+          <a:p>
+            <a:pPr marL="0" indent="0">
+              <a:buNone/>
+            </a:pPr>
+            <a:r>
+              <a:rPr lang="en-US" dirty="0" smtClean="0"/>
+              <a:t>	WHY ANGULAR ?</a:t>
+            </a:r>
+            <a:endParaRPr lang="en-US" dirty="0"/>
+          </a:p>
+          <a:p>
+            <a:pPr marL="0" indent="0">
+              <a:buNone/>
+            </a:pPr>
+            <a:r>
+              <a:rPr lang="en-US" dirty="0" smtClean="0"/>
+              <a:t>		1. Custom Components</a:t>
+            </a:r>
+          </a:p>
+          <a:p>
+            <a:pPr marL="0" indent="0">
+              <a:buNone/>
+            </a:pPr>
+            <a:r>
+              <a:rPr lang="en-US" dirty="0"/>
+              <a:t>	</a:t>
+            </a:r>
+            <a:r>
+              <a:rPr lang="en-US" dirty="0" smtClean="0"/>
+              <a:t>	2. Dependency Injection (DI)</a:t>
+            </a:r>
+          </a:p>
+          <a:p>
+            <a:pPr marL="0" indent="0">
+              <a:buNone/>
+            </a:pPr>
+            <a:r>
+              <a:rPr lang="en-US" dirty="0"/>
+              <a:t>	</a:t>
+            </a:r>
+            <a:r>
+              <a:rPr lang="en-US" dirty="0" smtClean="0"/>
+              <a:t>	3. Device Compatibility &amp; Seamless User Experience</a:t>
+            </a:r>
+            <a:endParaRPr lang="en-IN" dirty="0"/>
+          </a:p>
+        </p:txBody>
+      </p:sp>
+    </p:spTree>
+    <p:extLst>
+      <p:ext uri="{BB962C8B-B14F-4D97-AF65-F5344CB8AC3E}">
+        <p14:creationId xmlns:p14="http://schemas.microsoft.com/office/powerpoint/2010/main" val="958305093"/>
+      </p:ext>
+    </p:extLst>
+  </p:cSld>
+  <p:clrMapOvr>
+    <a:masterClrMapping/>
+  </p:clrMapOvr>
+  <p:timing>
+    <p:tnLst>
+      <p:par>
+        <p:cTn id="1" dur="indefinite" restart="never" nodeType="tmRoot"/>
+      </p:par>
+    </p:tnLst>
+  </p:timing>
+</p:sld>
+</file>
+
+<file path=ppt/slides/slide13.xml><?xml version="1.0" encoding="utf-8"?>
+<p:sld xmlns:a="http://schemas.openxmlformats.org/drawingml/2006/main" xmlns:r="http://schemas.openxmlformats.org/officeDocument/2006/relationships" xmlns:p="http://schemas.openxmlformats.org/presentationml/2006/main">
+  <p:cSld>
+    <p:spTree>
+      <p:nvGrpSpPr>
+        <p:cNvPr id="1" name=""/>
+        <p:cNvGrpSpPr/>
+        <p:nvPr/>
+      </p:nvGrpSpPr>
+      <p:grpSpPr>
+        <a:xfrm>
+          <a:off x="0" y="0"/>
+          <a:ext cx="0" cy="0"/>
+          <a:chOff x="0" y="0"/>
+          <a:chExt cx="0" cy="0"/>
+        </a:xfrm>
+      </p:grpSpPr>
+      <p:sp>
+        <p:nvSpPr>
+          <p:cNvPr id="2" name="Title 1"/>
+          <p:cNvSpPr>
+            <a:spLocks noGrp="1"/>
+          </p:cNvSpPr>
+          <p:nvPr>
+            <p:ph type="title"/>
+          </p:nvPr>
+        </p:nvSpPr>
+        <p:spPr>
+          <a:xfrm>
+            <a:off x="2945506" y="390886"/>
+            <a:ext cx="8610600" cy="1293028"/>
+          </a:xfrm>
+        </p:spPr>
+        <p:txBody>
+          <a:bodyPr/>
+          <a:lstStyle/>
+          <a:p>
+            <a:r>
+              <a:rPr lang="en-US" dirty="0" smtClean="0"/>
+              <a:t>IMPORTANT FILES</a:t>
+            </a:r>
+            <a:endParaRPr lang="en-IN" dirty="0"/>
+          </a:p>
+        </p:txBody>
+      </p:sp>
+      <p:sp>
+        <p:nvSpPr>
+          <p:cNvPr id="3" name="Content Placeholder 2"/>
+          <p:cNvSpPr>
+            <a:spLocks noGrp="1"/>
+          </p:cNvSpPr>
+          <p:nvPr>
+            <p:ph sz="half" idx="1"/>
+          </p:nvPr>
+        </p:nvSpPr>
+        <p:spPr>
+          <a:xfrm>
+            <a:off x="685800" y="1893194"/>
+            <a:ext cx="6565006" cy="4623515"/>
+          </a:xfrm>
+        </p:spPr>
+        <p:txBody>
+          <a:bodyPr>
+            <a:normAutofit lnSpcReduction="10000"/>
+          </a:bodyPr>
+          <a:lstStyle/>
+          <a:p>
+            <a:pPr>
+              <a:buFont typeface="Wingdings" panose="05000000000000000000" pitchFamily="2" charset="2"/>
+              <a:buChar char="Ø"/>
+            </a:pPr>
+            <a:r>
+              <a:rPr lang="en-US" u="sng" dirty="0" err="1"/>
+              <a:t>angular.json</a:t>
+            </a:r>
+            <a:r>
+              <a:rPr lang="en-US" dirty="0"/>
+              <a:t>: Stores information about the architecture, dependencies, build and test configurations</a:t>
+            </a:r>
+          </a:p>
+          <a:p>
+            <a:pPr>
+              <a:buFont typeface="Wingdings" panose="05000000000000000000" pitchFamily="2" charset="2"/>
+              <a:buChar char="Ø"/>
+            </a:pPr>
+            <a:r>
+              <a:rPr lang="en-US" dirty="0"/>
+              <a:t> </a:t>
+            </a:r>
+            <a:r>
+              <a:rPr lang="en-US" u="sng" dirty="0" err="1"/>
+              <a:t>package.json</a:t>
+            </a:r>
+            <a:r>
+              <a:rPr lang="en-US" dirty="0"/>
+              <a:t>: It is a file that contains information about the project and its dependencies</a:t>
+            </a:r>
+          </a:p>
+          <a:p>
+            <a:pPr>
+              <a:buFont typeface="Wingdings" panose="05000000000000000000" pitchFamily="2" charset="2"/>
+              <a:buChar char="Ø"/>
+            </a:pPr>
+            <a:r>
+              <a:rPr lang="en-US" dirty="0"/>
+              <a:t> </a:t>
+            </a:r>
+            <a:r>
+              <a:rPr lang="en-US" u="sng" dirty="0" err="1"/>
+              <a:t>tsconfig.json</a:t>
+            </a:r>
+            <a:r>
+              <a:rPr lang="en-US" dirty="0"/>
+              <a:t>: It specifies the base Typescript and Angular compiler options </a:t>
+            </a:r>
+          </a:p>
+          <a:p>
+            <a:pPr>
+              <a:buFont typeface="Wingdings" panose="05000000000000000000" pitchFamily="2" charset="2"/>
+              <a:buChar char="Ø"/>
+            </a:pPr>
+            <a:r>
+              <a:rPr lang="en-US" dirty="0"/>
+              <a:t> </a:t>
+            </a:r>
+            <a:r>
+              <a:rPr lang="en-US" u="sng" dirty="0" err="1"/>
+              <a:t>app.module.ts</a:t>
+            </a:r>
+            <a:r>
+              <a:rPr lang="en-US" dirty="0"/>
+              <a:t>: Maintains a track of all components and imports, required in the project</a:t>
+            </a:r>
+          </a:p>
+          <a:p>
+            <a:pPr>
+              <a:buFont typeface="Wingdings" panose="05000000000000000000" pitchFamily="2" charset="2"/>
+              <a:buChar char="Ø"/>
+            </a:pPr>
+            <a:r>
+              <a:rPr lang="en-US" dirty="0"/>
+              <a:t> </a:t>
+            </a:r>
+            <a:r>
+              <a:rPr lang="en-US" u="sng" dirty="0"/>
+              <a:t>app-</a:t>
+            </a:r>
+            <a:r>
+              <a:rPr lang="en-US" u="sng" dirty="0" err="1"/>
+              <a:t>routing.module.ts</a:t>
+            </a:r>
+            <a:r>
+              <a:rPr lang="en-US" dirty="0"/>
+              <a:t>: Specifies what component to be loaded, when a specific path is entered</a:t>
+            </a:r>
+          </a:p>
+          <a:p>
+            <a:pPr marL="0" indent="0">
+              <a:buNone/>
+            </a:pPr>
+            <a:endParaRPr lang="en-IN" dirty="0"/>
+          </a:p>
+        </p:txBody>
+      </p:sp>
+      <p:pic>
+        <p:nvPicPr>
+          <p:cNvPr id="5" name="Content Placeholder 4"/>
+          <p:cNvPicPr>
+            <a:picLocks noGrp="1" noChangeAspect="1"/>
+          </p:cNvPicPr>
+          <p:nvPr>
+            <p:ph sz="half" idx="2"/>
+          </p:nvPr>
+        </p:nvPicPr>
+        <p:blipFill>
+          <a:blip r:embed="rId2">
+            <a:extLst>
+              <a:ext uri="{28A0092B-C50C-407E-A947-70E740481C1C}">
+                <a14:useLocalDpi xmlns:a14="http://schemas.microsoft.com/office/drawing/2010/main" val="0"/>
+              </a:ext>
+            </a:extLst>
+          </a:blip>
+          <a:stretch>
+            <a:fillRect/>
+          </a:stretch>
+        </p:blipFill>
+        <p:spPr>
+          <a:xfrm>
+            <a:off x="8218084" y="2194558"/>
+            <a:ext cx="2935020" cy="4024125"/>
+          </a:xfrm>
+        </p:spPr>
+      </p:pic>
+    </p:spTree>
+    <p:extLst>
+      <p:ext uri="{BB962C8B-B14F-4D97-AF65-F5344CB8AC3E}">
+        <p14:creationId xmlns:p14="http://schemas.microsoft.com/office/powerpoint/2010/main" val="3739230120"/>
+      </p:ext>
+    </p:extLst>
+  </p:cSld>
+  <p:clrMapOvr>
+    <a:masterClrMapping/>
+  </p:clrMapOvr>
+  <p:timing>
+    <p:tnLst>
+      <p:par>
+        <p:cTn id="1" dur="indefinite" restart="never" nodeType="tmRoot"/>
+      </p:par>
+    </p:tnLst>
+  </p:timing>
 </p:sld>
 </file>
 
@@ -6533,12 +7110,21 @@
             <p:ph type="title"/>
           </p:nvPr>
         </p:nvSpPr>
-        <p:spPr/>
+        <p:spPr>
+          <a:xfrm>
+            <a:off x="3135456" y="356756"/>
+            <a:ext cx="8610599" cy="1303867"/>
+          </a:xfrm>
+        </p:spPr>
         <p:txBody>
           <a:bodyPr/>
           <a:lstStyle/>
           <a:p>
-            <a:endParaRPr lang="en-IN"/>
+            <a:r>
+              <a:rPr lang="en-US" dirty="0" smtClean="0"/>
+              <a:t>TECHNOLOGIES IMPLEMENTED</a:t>
+            </a:r>
+            <a:endParaRPr lang="en-IN" dirty="0"/>
           </a:p>
         </p:txBody>
       </p:sp>
@@ -6552,12 +7138,22 @@
             <p:ph type="body" idx="1"/>
           </p:nvPr>
         </p:nvSpPr>
-        <p:spPr/>
+        <p:spPr>
+          <a:xfrm>
+            <a:off x="0" y="2087136"/>
+            <a:ext cx="4364824" cy="617320"/>
+          </a:xfrm>
+        </p:spPr>
         <p:txBody>
           <a:bodyPr/>
           <a:lstStyle/>
           <a:p>
-            <a:endParaRPr lang="en-IN"/>
+            <a:pPr algn="ctr"/>
+            <a:r>
+              <a:rPr lang="en-US" dirty="0" smtClean="0"/>
+              <a:t>FRONT-END</a:t>
+            </a:r>
+            <a:endParaRPr lang="en-IN" dirty="0"/>
           </a:p>
         </p:txBody>
       </p:sp>
@@ -6571,101 +7167,1453 @@
             <p:ph type="body" sz="half" idx="15"/>
           </p:nvPr>
         </p:nvSpPr>
-        <p:spPr/>
+        <p:spPr>
+          <a:xfrm>
+            <a:off x="0" y="2904564"/>
+            <a:ext cx="4366858" cy="3953435"/>
+          </a:xfrm>
+        </p:spPr>
+        <p:txBody>
+          <a:bodyPr>
+            <a:normAutofit/>
+          </a:bodyPr>
+          <a:lstStyle/>
+          <a:p>
+            <a:endParaRPr lang="en-IN" sz="1800" dirty="0"/>
+          </a:p>
+        </p:txBody>
+      </p:sp>
+      <p:sp>
+        <p:nvSpPr>
+          <p:cNvPr id="5" name="Text Placeholder 4"/>
+          <p:cNvSpPr>
+            <a:spLocks noGrp="1"/>
+          </p:cNvSpPr>
+          <p:nvPr>
+            <p:ph type="body" sz="quarter" idx="3"/>
+          </p:nvPr>
+        </p:nvSpPr>
+        <p:spPr>
+          <a:xfrm>
+            <a:off x="4367783" y="2065866"/>
+            <a:ext cx="3679950" cy="626534"/>
+          </a:xfrm>
+        </p:spPr>
         <p:txBody>
           <a:bodyPr/>
           <a:lstStyle/>
           <a:p>
-            <a:endParaRPr lang="en-IN"/>
-          </a:p>
-        </p:txBody>
-      </p:sp>
-      <p:sp>
-        <p:nvSpPr>
-          <p:cNvPr id="5" name="Text Placeholder 4"/>
-          <p:cNvSpPr>
-            <a:spLocks noGrp="1"/>
-          </p:cNvSpPr>
-          <p:nvPr>
-            <p:ph type="body" sz="quarter" idx="3"/>
-          </p:nvPr>
-        </p:nvSpPr>
-        <p:spPr/>
+            <a:pPr algn="ctr"/>
+            <a:r>
+              <a:rPr lang="en-US" dirty="0" smtClean="0"/>
+              <a:t>BACK-END</a:t>
+            </a:r>
+            <a:endParaRPr lang="en-IN" dirty="0"/>
+          </a:p>
+        </p:txBody>
+      </p:sp>
+      <p:sp>
+        <p:nvSpPr>
+          <p:cNvPr id="6" name="Text Placeholder 5"/>
+          <p:cNvSpPr>
+            <a:spLocks noGrp="1"/>
+          </p:cNvSpPr>
+          <p:nvPr>
+            <p:ph type="body" sz="half" idx="16"/>
+          </p:nvPr>
+        </p:nvSpPr>
+        <p:spPr>
+          <a:xfrm>
+            <a:off x="4366858" y="2904067"/>
+            <a:ext cx="3684942" cy="3953932"/>
+          </a:xfrm>
+        </p:spPr>
         <p:txBody>
           <a:bodyPr/>
           <a:lstStyle/>
           <a:p>
-            <a:endParaRPr lang="en-IN"/>
-          </a:p>
-        </p:txBody>
-      </p:sp>
-      <p:sp>
-        <p:nvSpPr>
-          <p:cNvPr id="6" name="Text Placeholder 5"/>
-          <p:cNvSpPr>
-            <a:spLocks noGrp="1"/>
-          </p:cNvSpPr>
-          <p:nvPr>
-            <p:ph type="body" sz="half" idx="16"/>
-          </p:nvPr>
-        </p:nvSpPr>
-        <p:spPr/>
+            <a:endParaRPr lang="en-IN" dirty="0"/>
+          </a:p>
+        </p:txBody>
+      </p:sp>
+      <p:sp>
+        <p:nvSpPr>
+          <p:cNvPr id="7" name="Text Placeholder 6"/>
+          <p:cNvSpPr>
+            <a:spLocks noGrp="1"/>
+          </p:cNvSpPr>
+          <p:nvPr>
+            <p:ph type="body" sz="quarter" idx="13"/>
+          </p:nvPr>
+        </p:nvSpPr>
+        <p:spPr>
+          <a:xfrm>
+            <a:off x="8049766" y="2065866"/>
+            <a:ext cx="4142234" cy="626534"/>
+          </a:xfrm>
+        </p:spPr>
         <p:txBody>
           <a:bodyPr/>
           <a:lstStyle/>
           <a:p>
-            <a:endParaRPr lang="en-IN"/>
-          </a:p>
-        </p:txBody>
-      </p:sp>
-      <p:sp>
-        <p:nvSpPr>
-          <p:cNvPr id="7" name="Text Placeholder 6"/>
-          <p:cNvSpPr>
-            <a:spLocks noGrp="1"/>
-          </p:cNvSpPr>
-          <p:nvPr>
-            <p:ph type="body" sz="quarter" idx="13"/>
-          </p:nvPr>
-        </p:nvSpPr>
-        <p:spPr/>
+            <a:pPr algn="ctr"/>
+            <a:r>
+              <a:rPr lang="en-US" dirty="0" smtClean="0"/>
+              <a:t>MISCELLANEOUS</a:t>
+            </a:r>
+            <a:endParaRPr lang="en-IN" dirty="0"/>
+          </a:p>
+        </p:txBody>
+      </p:sp>
+      <p:sp>
+        <p:nvSpPr>
+          <p:cNvPr id="8" name="Text Placeholder 7"/>
+          <p:cNvSpPr>
+            <a:spLocks noGrp="1"/>
+          </p:cNvSpPr>
+          <p:nvPr>
+            <p:ph type="body" sz="half" idx="17"/>
+          </p:nvPr>
+        </p:nvSpPr>
+        <p:spPr>
+          <a:xfrm>
+            <a:off x="8051800" y="2904565"/>
+            <a:ext cx="4140200" cy="3953434"/>
+          </a:xfrm>
+        </p:spPr>
         <p:txBody>
           <a:bodyPr/>
           <a:lstStyle/>
           <a:p>
-            <a:endParaRPr lang="en-IN"/>
-          </a:p>
-        </p:txBody>
-      </p:sp>
-      <p:sp>
-        <p:nvSpPr>
-          <p:cNvPr id="8" name="Text Placeholder 7"/>
-          <p:cNvSpPr>
-            <a:spLocks noGrp="1"/>
-          </p:cNvSpPr>
-          <p:nvPr>
-            <p:ph type="body" sz="half" idx="17"/>
-          </p:nvPr>
-        </p:nvSpPr>
-        <p:spPr/>
-        <p:txBody>
-          <a:bodyPr/>
-          <a:lstStyle/>
-          <a:p>
-            <a:endParaRPr lang="en-IN"/>
-          </a:p>
-        </p:txBody>
-      </p:sp>
+            <a:endParaRPr lang="en-IN" dirty="0"/>
+          </a:p>
+        </p:txBody>
+      </p:sp>
+      <p:pic>
+        <p:nvPicPr>
+          <p:cNvPr id="11" name="Picture 10"/>
+          <p:cNvPicPr>
+            <a:picLocks noChangeAspect="1"/>
+          </p:cNvPicPr>
+          <p:nvPr/>
+        </p:nvPicPr>
+        <p:blipFill>
+          <a:blip r:embed="rId2">
+            <a:extLst>
+              <a:ext uri="{28A0092B-C50C-407E-A947-70E740481C1C}">
+                <a14:useLocalDpi xmlns:a14="http://schemas.microsoft.com/office/drawing/2010/main" val="0"/>
+              </a:ext>
+            </a:extLst>
+          </a:blip>
+          <a:stretch>
+            <a:fillRect/>
+          </a:stretch>
+        </p:blipFill>
+        <p:spPr>
+          <a:xfrm>
+            <a:off x="2642527" y="2994728"/>
+            <a:ext cx="1356267" cy="1326739"/>
+          </a:xfrm>
+          <a:prstGeom prst="rect">
+            <a:avLst/>
+          </a:prstGeom>
+        </p:spPr>
+      </p:pic>
+      <p:pic>
+        <p:nvPicPr>
+          <p:cNvPr id="12" name="Picture 11"/>
+          <p:cNvPicPr>
+            <a:picLocks noChangeAspect="1"/>
+          </p:cNvPicPr>
+          <p:nvPr/>
+        </p:nvPicPr>
+        <p:blipFill>
+          <a:blip r:embed="rId3" cstate="print">
+            <a:extLst>
+              <a:ext uri="{28A0092B-C50C-407E-A947-70E740481C1C}">
+                <a14:useLocalDpi xmlns:a14="http://schemas.microsoft.com/office/drawing/2010/main" val="0"/>
+              </a:ext>
+            </a:extLst>
+          </a:blip>
+          <a:stretch>
+            <a:fillRect/>
+          </a:stretch>
+        </p:blipFill>
+        <p:spPr>
+          <a:xfrm>
+            <a:off x="32547" y="2941962"/>
+            <a:ext cx="2005868" cy="1417400"/>
+          </a:xfrm>
+          <a:prstGeom prst="rect">
+            <a:avLst/>
+          </a:prstGeom>
+        </p:spPr>
+      </p:pic>
+      <p:pic>
+        <p:nvPicPr>
+          <p:cNvPr id="13" name="Picture 12"/>
+          <p:cNvPicPr>
+            <a:picLocks noChangeAspect="1"/>
+          </p:cNvPicPr>
+          <p:nvPr/>
+        </p:nvPicPr>
+        <p:blipFill>
+          <a:blip r:embed="rId4">
+            <a:extLst>
+              <a:ext uri="{28A0092B-C50C-407E-A947-70E740481C1C}">
+                <a14:useLocalDpi xmlns:a14="http://schemas.microsoft.com/office/drawing/2010/main" val="0"/>
+              </a:ext>
+            </a:extLst>
+          </a:blip>
+          <a:stretch>
+            <a:fillRect/>
+          </a:stretch>
+        </p:blipFill>
+        <p:spPr>
+          <a:xfrm>
+            <a:off x="50851" y="4444761"/>
+            <a:ext cx="2005869" cy="1506597"/>
+          </a:xfrm>
+          <a:prstGeom prst="rect">
+            <a:avLst/>
+          </a:prstGeom>
+        </p:spPr>
+      </p:pic>
+      <p:pic>
+        <p:nvPicPr>
+          <p:cNvPr id="14" name="Picture 13"/>
+          <p:cNvPicPr>
+            <a:picLocks noChangeAspect="1"/>
+          </p:cNvPicPr>
+          <p:nvPr/>
+        </p:nvPicPr>
+        <p:blipFill>
+          <a:blip r:embed="rId5" cstate="print">
+            <a:extLst>
+              <a:ext uri="{28A0092B-C50C-407E-A947-70E740481C1C}">
+                <a14:useLocalDpi xmlns:a14="http://schemas.microsoft.com/office/drawing/2010/main" val="0"/>
+              </a:ext>
+            </a:extLst>
+          </a:blip>
+          <a:stretch>
+            <a:fillRect/>
+          </a:stretch>
+        </p:blipFill>
+        <p:spPr>
+          <a:xfrm>
+            <a:off x="191619" y="6036757"/>
+            <a:ext cx="1724331" cy="733955"/>
+          </a:xfrm>
+          <a:prstGeom prst="rect">
+            <a:avLst/>
+          </a:prstGeom>
+        </p:spPr>
+      </p:pic>
+      <p:pic>
+        <p:nvPicPr>
+          <p:cNvPr id="15" name="Picture 14"/>
+          <p:cNvPicPr>
+            <a:picLocks noChangeAspect="1"/>
+          </p:cNvPicPr>
+          <p:nvPr/>
+        </p:nvPicPr>
+        <p:blipFill>
+          <a:blip r:embed="rId6" cstate="print">
+            <a:extLst>
+              <a:ext uri="{28A0092B-C50C-407E-A947-70E740481C1C}">
+                <a14:useLocalDpi xmlns:a14="http://schemas.microsoft.com/office/drawing/2010/main" val="0"/>
+              </a:ext>
+            </a:extLst>
+          </a:blip>
+          <a:stretch>
+            <a:fillRect/>
+          </a:stretch>
+        </p:blipFill>
+        <p:spPr>
+          <a:xfrm>
+            <a:off x="2724338" y="4501718"/>
+            <a:ext cx="912503" cy="940084"/>
+          </a:xfrm>
+          <a:prstGeom prst="rect">
+            <a:avLst/>
+          </a:prstGeom>
+        </p:spPr>
+      </p:pic>
+      <p:pic>
+        <p:nvPicPr>
+          <p:cNvPr id="16" name="Picture 15"/>
+          <p:cNvPicPr>
+            <a:picLocks noChangeAspect="1"/>
+          </p:cNvPicPr>
+          <p:nvPr/>
+        </p:nvPicPr>
+        <p:blipFill>
+          <a:blip r:embed="rId7" cstate="print">
+            <a:extLst>
+              <a:ext uri="{28A0092B-C50C-407E-A947-70E740481C1C}">
+                <a14:useLocalDpi xmlns:a14="http://schemas.microsoft.com/office/drawing/2010/main" val="0"/>
+              </a:ext>
+            </a:extLst>
+          </a:blip>
+          <a:stretch>
+            <a:fillRect/>
+          </a:stretch>
+        </p:blipFill>
+        <p:spPr>
+          <a:xfrm>
+            <a:off x="2650970" y="5679308"/>
+            <a:ext cx="1228345" cy="985613"/>
+          </a:xfrm>
+          <a:prstGeom prst="rect">
+            <a:avLst/>
+          </a:prstGeom>
+        </p:spPr>
+      </p:pic>
+      <p:pic>
+        <p:nvPicPr>
+          <p:cNvPr id="17" name="Picture 16"/>
+          <p:cNvPicPr>
+            <a:picLocks noChangeAspect="1"/>
+          </p:cNvPicPr>
+          <p:nvPr/>
+        </p:nvPicPr>
+        <p:blipFill>
+          <a:blip r:embed="rId8">
+            <a:extLst>
+              <a:ext uri="{28A0092B-C50C-407E-A947-70E740481C1C}">
+                <a14:useLocalDpi xmlns:a14="http://schemas.microsoft.com/office/drawing/2010/main" val="0"/>
+              </a:ext>
+            </a:extLst>
+          </a:blip>
+          <a:stretch>
+            <a:fillRect/>
+          </a:stretch>
+        </p:blipFill>
+        <p:spPr>
+          <a:xfrm>
+            <a:off x="4461908" y="2941962"/>
+            <a:ext cx="1498141" cy="1231205"/>
+          </a:xfrm>
+          <a:prstGeom prst="rect">
+            <a:avLst/>
+          </a:prstGeom>
+        </p:spPr>
+      </p:pic>
+      <p:pic>
+        <p:nvPicPr>
+          <p:cNvPr id="19" name="Picture 18"/>
+          <p:cNvPicPr>
+            <a:picLocks noChangeAspect="1"/>
+          </p:cNvPicPr>
+          <p:nvPr/>
+        </p:nvPicPr>
+        <p:blipFill>
+          <a:blip r:embed="rId9" cstate="print">
+            <a:extLst>
+              <a:ext uri="{28A0092B-C50C-407E-A947-70E740481C1C}">
+                <a14:useLocalDpi xmlns:a14="http://schemas.microsoft.com/office/drawing/2010/main" val="0"/>
+              </a:ext>
+            </a:extLst>
+          </a:blip>
+          <a:stretch>
+            <a:fillRect/>
+          </a:stretch>
+        </p:blipFill>
+        <p:spPr>
+          <a:xfrm>
+            <a:off x="6381248" y="3667917"/>
+            <a:ext cx="1563225" cy="1123463"/>
+          </a:xfrm>
+          <a:prstGeom prst="rect">
+            <a:avLst/>
+          </a:prstGeom>
+        </p:spPr>
+      </p:pic>
+      <p:pic>
+        <p:nvPicPr>
+          <p:cNvPr id="20" name="Picture 19"/>
+          <p:cNvPicPr>
+            <a:picLocks noChangeAspect="1"/>
+          </p:cNvPicPr>
+          <p:nvPr/>
+        </p:nvPicPr>
+        <p:blipFill>
+          <a:blip r:embed="rId10">
+            <a:extLst>
+              <a:ext uri="{28A0092B-C50C-407E-A947-70E740481C1C}">
+                <a14:useLocalDpi xmlns:a14="http://schemas.microsoft.com/office/drawing/2010/main" val="0"/>
+              </a:ext>
+            </a:extLst>
+          </a:blip>
+          <a:stretch>
+            <a:fillRect/>
+          </a:stretch>
+        </p:blipFill>
+        <p:spPr>
+          <a:xfrm>
+            <a:off x="4544493" y="4821204"/>
+            <a:ext cx="1836755" cy="808378"/>
+          </a:xfrm>
+          <a:prstGeom prst="rect">
+            <a:avLst/>
+          </a:prstGeom>
+        </p:spPr>
+      </p:pic>
+      <p:pic>
+        <p:nvPicPr>
+          <p:cNvPr id="21" name="Picture 20"/>
+          <p:cNvPicPr>
+            <a:picLocks noChangeAspect="1"/>
+          </p:cNvPicPr>
+          <p:nvPr/>
+        </p:nvPicPr>
+        <p:blipFill>
+          <a:blip r:embed="rId11" cstate="print">
+            <a:extLst>
+              <a:ext uri="{28A0092B-C50C-407E-A947-70E740481C1C}">
+                <a14:useLocalDpi xmlns:a14="http://schemas.microsoft.com/office/drawing/2010/main" val="0"/>
+              </a:ext>
+            </a:extLst>
+          </a:blip>
+          <a:stretch>
+            <a:fillRect/>
+          </a:stretch>
+        </p:blipFill>
+        <p:spPr>
+          <a:xfrm>
+            <a:off x="6634506" y="5504424"/>
+            <a:ext cx="1164035" cy="1160497"/>
+          </a:xfrm>
+          <a:prstGeom prst="rect">
+            <a:avLst/>
+          </a:prstGeom>
+        </p:spPr>
+      </p:pic>
+      <p:pic>
+        <p:nvPicPr>
+          <p:cNvPr id="22" name="Picture 21"/>
+          <p:cNvPicPr>
+            <a:picLocks noChangeAspect="1"/>
+          </p:cNvPicPr>
+          <p:nvPr/>
+        </p:nvPicPr>
+        <p:blipFill>
+          <a:blip r:embed="rId12">
+            <a:extLst>
+              <a:ext uri="{28A0092B-C50C-407E-A947-70E740481C1C}">
+                <a14:useLocalDpi xmlns:a14="http://schemas.microsoft.com/office/drawing/2010/main" val="0"/>
+              </a:ext>
+            </a:extLst>
+          </a:blip>
+          <a:stretch>
+            <a:fillRect/>
+          </a:stretch>
+        </p:blipFill>
+        <p:spPr>
+          <a:xfrm>
+            <a:off x="8172171" y="2877289"/>
+            <a:ext cx="1837917" cy="1470956"/>
+          </a:xfrm>
+          <a:prstGeom prst="rect">
+            <a:avLst/>
+          </a:prstGeom>
+        </p:spPr>
+      </p:pic>
+      <p:pic>
+        <p:nvPicPr>
+          <p:cNvPr id="23" name="Picture 22"/>
+          <p:cNvPicPr>
+            <a:picLocks noChangeAspect="1"/>
+          </p:cNvPicPr>
+          <p:nvPr/>
+        </p:nvPicPr>
+        <p:blipFill>
+          <a:blip r:embed="rId13">
+            <a:extLst>
+              <a:ext uri="{28A0092B-C50C-407E-A947-70E740481C1C}">
+                <a14:useLocalDpi xmlns:a14="http://schemas.microsoft.com/office/drawing/2010/main" val="0"/>
+              </a:ext>
+            </a:extLst>
+          </a:blip>
+          <a:stretch>
+            <a:fillRect/>
+          </a:stretch>
+        </p:blipFill>
+        <p:spPr>
+          <a:xfrm>
+            <a:off x="9520032" y="4560410"/>
+            <a:ext cx="2226023" cy="1600200"/>
+          </a:xfrm>
+          <a:prstGeom prst="rect">
+            <a:avLst/>
+          </a:prstGeom>
+        </p:spPr>
+      </p:pic>
+      <p:cxnSp>
+        <p:nvCxnSpPr>
+          <p:cNvPr id="27" name="Straight Connector 26"/>
+          <p:cNvCxnSpPr/>
+          <p:nvPr/>
+        </p:nvCxnSpPr>
+        <p:spPr>
+          <a:xfrm>
+            <a:off x="4366858" y="1872788"/>
+            <a:ext cx="0" cy="5114866"/>
+          </a:xfrm>
+          <a:prstGeom prst="line">
+            <a:avLst/>
+          </a:prstGeom>
+          <a:ln>
+            <a:solidFill>
+              <a:schemeClr val="tx1"/>
+            </a:solidFill>
+          </a:ln>
+        </p:spPr>
+        <p:style>
+          <a:lnRef idx="3">
+            <a:schemeClr val="dk1"/>
+          </a:lnRef>
+          <a:fillRef idx="0">
+            <a:schemeClr val="dk1"/>
+          </a:fillRef>
+          <a:effectRef idx="2">
+            <a:schemeClr val="dk1"/>
+          </a:effectRef>
+          <a:fontRef idx="minor">
+            <a:schemeClr val="tx1"/>
+          </a:fontRef>
+        </p:style>
+      </p:cxnSp>
+      <p:cxnSp>
+        <p:nvCxnSpPr>
+          <p:cNvPr id="33" name="Straight Connector 32"/>
+          <p:cNvCxnSpPr/>
+          <p:nvPr/>
+        </p:nvCxnSpPr>
+        <p:spPr>
+          <a:xfrm flipV="1">
+            <a:off x="8049766" y="1977059"/>
+            <a:ext cx="0" cy="4880941"/>
+          </a:xfrm>
+          <a:prstGeom prst="line">
+            <a:avLst/>
+          </a:prstGeom>
+          <a:ln>
+            <a:solidFill>
+              <a:schemeClr val="tx1"/>
+            </a:solidFill>
+          </a:ln>
+        </p:spPr>
+        <p:style>
+          <a:lnRef idx="1">
+            <a:schemeClr val="accent1"/>
+          </a:lnRef>
+          <a:fillRef idx="0">
+            <a:schemeClr val="accent1"/>
+          </a:fillRef>
+          <a:effectRef idx="0">
+            <a:schemeClr val="accent1"/>
+          </a:effectRef>
+          <a:fontRef idx="minor">
+            <a:schemeClr val="tx1"/>
+          </a:fontRef>
+        </p:style>
+      </p:cxnSp>
     </p:spTree>
     <p:extLst>
       <p:ext uri="{BB962C8B-B14F-4D97-AF65-F5344CB8AC3E}">
-        <p14:creationId xmlns:p14="http://schemas.microsoft.com/office/powerpoint/2010/main" val="1843758970"/>
+        <p14:creationId xmlns:p14="http://schemas.microsoft.com/office/powerpoint/2010/main" val="704271585"/>
       </p:ext>
     </p:extLst>
   </p:cSld>
   <p:clrMapOvr>
     <a:masterClrMapping/>
   </p:clrMapOvr>
+  <p:timing>
+    <p:tnLst>
+      <p:par>
+        <p:cTn id="1" dur="indefinite" restart="never" nodeType="tmRoot"/>
+      </p:par>
+    </p:tnLst>
+  </p:timing>
+</p:sld>
+</file>
+
+<file path=ppt/slides/slide3.xml><?xml version="1.0" encoding="utf-8"?>
+<p:sld xmlns:a="http://schemas.openxmlformats.org/drawingml/2006/main" xmlns:r="http://schemas.openxmlformats.org/officeDocument/2006/relationships" xmlns:p="http://schemas.openxmlformats.org/presentationml/2006/main">
+  <p:cSld>
+    <p:spTree>
+      <p:nvGrpSpPr>
+        <p:cNvPr id="1" name=""/>
+        <p:cNvGrpSpPr/>
+        <p:nvPr/>
+      </p:nvGrpSpPr>
+      <p:grpSpPr>
+        <a:xfrm>
+          <a:off x="0" y="0"/>
+          <a:ext cx="0" cy="0"/>
+          <a:chOff x="0" y="0"/>
+          <a:chExt cx="0" cy="0"/>
+        </a:xfrm>
+      </p:grpSpPr>
+      <p:sp>
+        <p:nvSpPr>
+          <p:cNvPr id="2" name="Title 1"/>
+          <p:cNvSpPr>
+            <a:spLocks noGrp="1"/>
+          </p:cNvSpPr>
+          <p:nvPr>
+            <p:ph type="title"/>
+          </p:nvPr>
+        </p:nvSpPr>
+        <p:spPr>
+          <a:xfrm>
+            <a:off x="2895599" y="506795"/>
+            <a:ext cx="8610600" cy="1293028"/>
+          </a:xfrm>
+        </p:spPr>
+        <p:txBody>
+          <a:bodyPr/>
+          <a:lstStyle/>
+          <a:p>
+            <a:r>
+              <a:rPr lang="en-US" dirty="0" smtClean="0"/>
+              <a:t>ARCHITECTURE DIAGRAM </a:t>
+            </a:r>
+            <a:endParaRPr lang="en-IN" dirty="0"/>
+          </a:p>
+        </p:txBody>
+      </p:sp>
+      <p:pic>
+        <p:nvPicPr>
+          <p:cNvPr id="4" name="Content Placeholder 3"/>
+          <p:cNvPicPr>
+            <a:picLocks noGrp="1" noChangeAspect="1"/>
+          </p:cNvPicPr>
+          <p:nvPr>
+            <p:ph idx="1"/>
+          </p:nvPr>
+        </p:nvPicPr>
+        <p:blipFill>
+          <a:blip r:embed="rId2"/>
+          <a:stretch>
+            <a:fillRect/>
+          </a:stretch>
+        </p:blipFill>
+        <p:spPr>
+          <a:xfrm>
+            <a:off x="721216" y="2331076"/>
+            <a:ext cx="10784983" cy="4391696"/>
+          </a:xfrm>
+          <a:prstGeom prst="rect">
+            <a:avLst/>
+          </a:prstGeom>
+        </p:spPr>
+      </p:pic>
+    </p:spTree>
+    <p:extLst>
+      <p:ext uri="{BB962C8B-B14F-4D97-AF65-F5344CB8AC3E}">
+        <p14:creationId xmlns:p14="http://schemas.microsoft.com/office/powerpoint/2010/main" val="510589901"/>
+      </p:ext>
+    </p:extLst>
+  </p:cSld>
+  <p:clrMapOvr>
+    <a:masterClrMapping/>
+  </p:clrMapOvr>
+  <p:timing>
+    <p:tnLst>
+      <p:par>
+        <p:cTn id="1" dur="indefinite" restart="never" nodeType="tmRoot"/>
+      </p:par>
+    </p:tnLst>
+  </p:timing>
+</p:sld>
+</file>
+
+<file path=ppt/slides/slide4.xml><?xml version="1.0" encoding="utf-8"?>
+<p:sld xmlns:a="http://schemas.openxmlformats.org/drawingml/2006/main" xmlns:r="http://schemas.openxmlformats.org/officeDocument/2006/relationships" xmlns:p="http://schemas.openxmlformats.org/presentationml/2006/main">
+  <p:cSld>
+    <p:spTree>
+      <p:nvGrpSpPr>
+        <p:cNvPr id="1" name=""/>
+        <p:cNvGrpSpPr/>
+        <p:nvPr/>
+      </p:nvGrpSpPr>
+      <p:grpSpPr>
+        <a:xfrm>
+          <a:off x="0" y="0"/>
+          <a:ext cx="0" cy="0"/>
+          <a:chOff x="0" y="0"/>
+          <a:chExt cx="0" cy="0"/>
+        </a:xfrm>
+      </p:grpSpPr>
+      <p:sp>
+        <p:nvSpPr>
+          <p:cNvPr id="2" name="Title 1"/>
+          <p:cNvSpPr>
+            <a:spLocks noGrp="1"/>
+          </p:cNvSpPr>
+          <p:nvPr>
+            <p:ph type="title"/>
+          </p:nvPr>
+        </p:nvSpPr>
+        <p:spPr>
+          <a:xfrm>
+            <a:off x="2947116" y="390885"/>
+            <a:ext cx="8610600" cy="1293028"/>
+          </a:xfrm>
+        </p:spPr>
+        <p:txBody>
+          <a:bodyPr/>
+          <a:lstStyle/>
+          <a:p>
+            <a:r>
+              <a:rPr lang="en-US" dirty="0" smtClean="0"/>
+              <a:t>BACK-END MODULE</a:t>
+            </a:r>
+            <a:endParaRPr lang="en-IN" dirty="0"/>
+          </a:p>
+        </p:txBody>
+      </p:sp>
+      <p:sp>
+        <p:nvSpPr>
+          <p:cNvPr id="3" name="Content Placeholder 2"/>
+          <p:cNvSpPr>
+            <a:spLocks noGrp="1"/>
+          </p:cNvSpPr>
+          <p:nvPr>
+            <p:ph idx="1"/>
+          </p:nvPr>
+        </p:nvSpPr>
+        <p:spPr>
+          <a:xfrm>
+            <a:off x="0" y="2194560"/>
+            <a:ext cx="12192000" cy="4663440"/>
+          </a:xfrm>
+        </p:spPr>
+        <p:txBody>
+          <a:bodyPr>
+            <a:normAutofit/>
+          </a:bodyPr>
+          <a:lstStyle/>
+          <a:p>
+            <a:r>
+              <a:rPr lang="en-US" dirty="0" smtClean="0"/>
+              <a:t>Implements Spring Boot as the web based framework of JAVA</a:t>
+            </a:r>
+          </a:p>
+          <a:p>
+            <a:r>
+              <a:rPr lang="en-US" dirty="0" smtClean="0"/>
+              <a:t>Follows Micro-service based architecture</a:t>
+            </a:r>
+          </a:p>
+          <a:p>
+            <a:endParaRPr lang="en-US" dirty="0"/>
+          </a:p>
+          <a:p>
+            <a:pPr marL="0" indent="0">
+              <a:buNone/>
+            </a:pPr>
+            <a:r>
+              <a:rPr lang="en-US" dirty="0" smtClean="0"/>
+              <a:t>	Micro-services included in Backend module: </a:t>
+            </a:r>
+          </a:p>
+          <a:p>
+            <a:pPr marL="0" indent="0">
+              <a:buNone/>
+            </a:pPr>
+            <a:r>
+              <a:rPr lang="en-US" dirty="0" smtClean="0"/>
+              <a:t>		1. Customer Auth (Port# 8081)</a:t>
+            </a:r>
+          </a:p>
+          <a:p>
+            <a:pPr marL="0" indent="0">
+              <a:buNone/>
+            </a:pPr>
+            <a:r>
+              <a:rPr lang="en-US" dirty="0" smtClean="0"/>
+              <a:t>		2. Customer Service (Port# 8082)</a:t>
+            </a:r>
+          </a:p>
+          <a:p>
+            <a:pPr marL="0" indent="0">
+              <a:buNone/>
+            </a:pPr>
+            <a:r>
+              <a:rPr lang="en-US" dirty="0" smtClean="0"/>
+              <a:t>		3. Restaurant Service (Port# 8083)</a:t>
+            </a:r>
+          </a:p>
+          <a:p>
+            <a:pPr marL="0" indent="0">
+              <a:buNone/>
+            </a:pPr>
+            <a:r>
+              <a:rPr lang="en-US" dirty="0" smtClean="0"/>
+              <a:t>		4. Order Service (Port# 8084)</a:t>
+            </a:r>
+          </a:p>
+          <a:p>
+            <a:pPr marL="0" indent="0">
+              <a:buNone/>
+            </a:pPr>
+            <a:r>
+              <a:rPr lang="en-US" dirty="0" smtClean="0"/>
+              <a:t>		5. Eureka Server (Port# 8761)</a:t>
+            </a:r>
+          </a:p>
+          <a:p>
+            <a:pPr marL="0" indent="0">
+              <a:buNone/>
+            </a:pPr>
+            <a:r>
+              <a:rPr lang="en-US" dirty="0" smtClean="0"/>
+              <a:t>		6. API Gateway (Port# 9000)</a:t>
+            </a:r>
+            <a:endParaRPr lang="en-US" dirty="0"/>
+          </a:p>
+          <a:p>
+            <a:pPr marL="0" indent="0">
+              <a:buNone/>
+            </a:pPr>
+            <a:endParaRPr lang="en-IN" dirty="0"/>
+          </a:p>
+        </p:txBody>
+      </p:sp>
+    </p:spTree>
+    <p:extLst>
+      <p:ext uri="{BB962C8B-B14F-4D97-AF65-F5344CB8AC3E}">
+        <p14:creationId xmlns:p14="http://schemas.microsoft.com/office/powerpoint/2010/main" val="376248321"/>
+      </p:ext>
+    </p:extLst>
+  </p:cSld>
+  <p:clrMapOvr>
+    <a:masterClrMapping/>
+  </p:clrMapOvr>
+  <p:timing>
+    <p:tnLst>
+      <p:par>
+        <p:cTn id="1" dur="indefinite" restart="never" nodeType="tmRoot"/>
+      </p:par>
+    </p:tnLst>
+  </p:timing>
+</p:sld>
+</file>
+
+<file path=ppt/slides/slide5.xml><?xml version="1.0" encoding="utf-8"?>
+<p:sld xmlns:a="http://schemas.openxmlformats.org/drawingml/2006/main" xmlns:r="http://schemas.openxmlformats.org/officeDocument/2006/relationships" xmlns:p="http://schemas.openxmlformats.org/presentationml/2006/main">
+  <p:cSld>
+    <p:spTree>
+      <p:nvGrpSpPr>
+        <p:cNvPr id="1" name=""/>
+        <p:cNvGrpSpPr/>
+        <p:nvPr/>
+      </p:nvGrpSpPr>
+      <p:grpSpPr>
+        <a:xfrm>
+          <a:off x="0" y="0"/>
+          <a:ext cx="0" cy="0"/>
+          <a:chOff x="0" y="0"/>
+          <a:chExt cx="0" cy="0"/>
+        </a:xfrm>
+      </p:grpSpPr>
+      <p:sp>
+        <p:nvSpPr>
+          <p:cNvPr id="2" name="Title 1"/>
+          <p:cNvSpPr>
+            <a:spLocks noGrp="1"/>
+          </p:cNvSpPr>
+          <p:nvPr>
+            <p:ph type="title"/>
+          </p:nvPr>
+        </p:nvSpPr>
+        <p:spPr>
+          <a:xfrm>
+            <a:off x="2895600" y="416644"/>
+            <a:ext cx="8610600" cy="1293028"/>
+          </a:xfrm>
+        </p:spPr>
+        <p:txBody>
+          <a:bodyPr/>
+          <a:lstStyle/>
+          <a:p>
+            <a:r>
+              <a:rPr lang="en-US" dirty="0" smtClean="0"/>
+              <a:t>IMPORTANT FILES </a:t>
+            </a:r>
+            <a:endParaRPr lang="en-IN" dirty="0"/>
+          </a:p>
+        </p:txBody>
+      </p:sp>
+      <p:sp>
+        <p:nvSpPr>
+          <p:cNvPr id="3" name="Content Placeholder 2"/>
+          <p:cNvSpPr>
+            <a:spLocks noGrp="1"/>
+          </p:cNvSpPr>
+          <p:nvPr>
+            <p:ph idx="1"/>
+          </p:nvPr>
+        </p:nvSpPr>
+        <p:spPr>
+          <a:xfrm>
+            <a:off x="775952" y="1709672"/>
+            <a:ext cx="10820400" cy="4024125"/>
+          </a:xfrm>
+        </p:spPr>
+        <p:txBody>
+          <a:bodyPr/>
+          <a:lstStyle/>
+          <a:p>
+            <a:pPr>
+              <a:buFont typeface="Wingdings" panose="05000000000000000000" pitchFamily="2" charset="2"/>
+              <a:buChar char="Ø"/>
+            </a:pPr>
+            <a:r>
+              <a:rPr lang="en-US" dirty="0"/>
+              <a:t> </a:t>
+            </a:r>
+            <a:r>
+              <a:rPr lang="en-US" u="sng" dirty="0"/>
+              <a:t>Dockerfile</a:t>
+            </a:r>
+            <a:r>
+              <a:rPr lang="en-US" dirty="0"/>
+              <a:t>:  It is a document containing all the commands the user requires to call on the command line to assemble an image</a:t>
+            </a:r>
+          </a:p>
+          <a:p>
+            <a:pPr>
+              <a:buFont typeface="Wingdings" panose="05000000000000000000" pitchFamily="2" charset="2"/>
+              <a:buChar char="Ø"/>
+            </a:pPr>
+            <a:r>
+              <a:rPr lang="en-US" dirty="0"/>
+              <a:t> </a:t>
+            </a:r>
+            <a:r>
+              <a:rPr lang="en-US" u="sng" dirty="0"/>
+              <a:t>application.yml</a:t>
+            </a:r>
+            <a:r>
+              <a:rPr lang="en-US" dirty="0"/>
+              <a:t>: It is primarily used to modify configuration parameters, such as connectivity with database, port number, eureka registry etc.</a:t>
+            </a:r>
+          </a:p>
+          <a:p>
+            <a:pPr>
+              <a:buFont typeface="Wingdings" panose="05000000000000000000" pitchFamily="2" charset="2"/>
+              <a:buChar char="Ø"/>
+            </a:pPr>
+            <a:r>
+              <a:rPr lang="en-US" dirty="0"/>
+              <a:t> </a:t>
+            </a:r>
+            <a:r>
+              <a:rPr lang="en-US" u="sng" dirty="0"/>
+              <a:t>pom.xml</a:t>
+            </a:r>
+            <a:r>
+              <a:rPr lang="en-US" dirty="0"/>
+              <a:t>:  It is used to keep a track of project details such as group ID, artifact ID, and also all the list of dependencies required </a:t>
+            </a:r>
+          </a:p>
+          <a:p>
+            <a:pPr>
+              <a:buFont typeface="Wingdings" panose="05000000000000000000" pitchFamily="2" charset="2"/>
+              <a:buChar char="Ø"/>
+            </a:pPr>
+            <a:r>
+              <a:rPr lang="en-US" dirty="0"/>
+              <a:t> </a:t>
+            </a:r>
+            <a:r>
+              <a:rPr lang="en-US" u="sng" dirty="0"/>
+              <a:t>compose.yaml</a:t>
+            </a:r>
+            <a:r>
+              <a:rPr lang="en-US" dirty="0"/>
+              <a:t>: It is used to run multi-container docker application. </a:t>
+            </a:r>
+          </a:p>
+          <a:p>
+            <a:pPr marL="0" indent="0">
+              <a:buNone/>
+            </a:pPr>
+            <a:endParaRPr lang="en-IN" dirty="0"/>
+          </a:p>
+        </p:txBody>
+      </p:sp>
+    </p:spTree>
+    <p:extLst>
+      <p:ext uri="{BB962C8B-B14F-4D97-AF65-F5344CB8AC3E}">
+        <p14:creationId xmlns:p14="http://schemas.microsoft.com/office/powerpoint/2010/main" val="969888497"/>
+      </p:ext>
+    </p:extLst>
+  </p:cSld>
+  <p:clrMapOvr>
+    <a:masterClrMapping/>
+  </p:clrMapOvr>
+  <p:timing>
+    <p:tnLst>
+      <p:par>
+        <p:cTn id="1" dur="indefinite" restart="never" nodeType="tmRoot"/>
+      </p:par>
+    </p:tnLst>
+  </p:timing>
+</p:sld>
+</file>
+
+<file path=ppt/slides/slide6.xml><?xml version="1.0" encoding="utf-8"?>
+<p:sld xmlns:a="http://schemas.openxmlformats.org/drawingml/2006/main" xmlns:r="http://schemas.openxmlformats.org/officeDocument/2006/relationships" xmlns:p="http://schemas.openxmlformats.org/presentationml/2006/main">
+  <p:cSld>
+    <p:spTree>
+      <p:nvGrpSpPr>
+        <p:cNvPr id="1" name=""/>
+        <p:cNvGrpSpPr/>
+        <p:nvPr/>
+      </p:nvGrpSpPr>
+      <p:grpSpPr>
+        <a:xfrm>
+          <a:off x="0" y="0"/>
+          <a:ext cx="0" cy="0"/>
+          <a:chOff x="0" y="0"/>
+          <a:chExt cx="0" cy="0"/>
+        </a:xfrm>
+      </p:grpSpPr>
+      <p:sp>
+        <p:nvSpPr>
+          <p:cNvPr id="2" name="Title 1"/>
+          <p:cNvSpPr>
+            <a:spLocks noGrp="1"/>
+          </p:cNvSpPr>
+          <p:nvPr>
+            <p:ph type="title"/>
+          </p:nvPr>
+        </p:nvSpPr>
+        <p:spPr/>
+        <p:txBody>
+          <a:bodyPr/>
+          <a:lstStyle/>
+          <a:p>
+            <a:r>
+              <a:rPr lang="en-US" dirty="0" smtClean="0"/>
+              <a:t>CUSTOMER AUTH</a:t>
+            </a:r>
+            <a:endParaRPr lang="en-IN" dirty="0"/>
+          </a:p>
+        </p:txBody>
+      </p:sp>
+      <p:sp>
+        <p:nvSpPr>
+          <p:cNvPr id="3" name="Content Placeholder 2"/>
+          <p:cNvSpPr>
+            <a:spLocks noGrp="1"/>
+          </p:cNvSpPr>
+          <p:nvPr>
+            <p:ph sz="half" idx="1"/>
+          </p:nvPr>
+        </p:nvSpPr>
+        <p:spPr>
+          <a:xfrm>
+            <a:off x="685800" y="2194559"/>
+            <a:ext cx="5334000" cy="4438061"/>
+          </a:xfrm>
+        </p:spPr>
+        <p:txBody>
+          <a:bodyPr/>
+          <a:lstStyle/>
+          <a:p>
+            <a:pPr marL="0" indent="0">
+              <a:buNone/>
+            </a:pPr>
+            <a:r>
+              <a:rPr lang="en-US" dirty="0"/>
+              <a:t>Purpose:</a:t>
+            </a:r>
+          </a:p>
+          <a:p>
+            <a:r>
+              <a:rPr lang="en-US" dirty="0"/>
+              <a:t>Allows new Users to register</a:t>
+            </a:r>
+          </a:p>
+          <a:p>
+            <a:r>
+              <a:rPr lang="en-US" dirty="0"/>
+              <a:t>Allows registered user to login</a:t>
+            </a:r>
+          </a:p>
+          <a:p>
+            <a:r>
+              <a:rPr lang="en-US" dirty="0"/>
+              <a:t>Generates a JSON Web Token (JWT), whenever a registered user logs in</a:t>
+            </a:r>
+          </a:p>
+          <a:p>
+            <a:endParaRPr lang="en-US" dirty="0"/>
+          </a:p>
+          <a:p>
+            <a:pPr marL="0" indent="0">
+              <a:buNone/>
+            </a:pPr>
+            <a:r>
+              <a:rPr lang="en-US" dirty="0" smtClean="0"/>
+              <a:t>Customer Details </a:t>
+            </a:r>
+            <a:r>
+              <a:rPr lang="en-US" dirty="0"/>
+              <a:t>are stored in MySQL Database</a:t>
+            </a:r>
+          </a:p>
+          <a:p>
+            <a:pPr marL="0" indent="0">
+              <a:buNone/>
+            </a:pPr>
+            <a:endParaRPr lang="en-IN" dirty="0"/>
+          </a:p>
+        </p:txBody>
+      </p:sp>
+      <p:pic>
+        <p:nvPicPr>
+          <p:cNvPr id="6" name="Content Placeholder 4"/>
+          <p:cNvPicPr>
+            <a:picLocks noGrp="1" noChangeAspect="1"/>
+          </p:cNvPicPr>
+          <p:nvPr>
+            <p:ph sz="half" idx="2"/>
+          </p:nvPr>
+        </p:nvPicPr>
+        <p:blipFill>
+          <a:blip r:embed="rId2"/>
+          <a:stretch>
+            <a:fillRect/>
+          </a:stretch>
+        </p:blipFill>
+        <p:spPr>
+          <a:xfrm>
+            <a:off x="6172199" y="2194559"/>
+            <a:ext cx="5676363" cy="4438061"/>
+          </a:xfrm>
+          <a:prstGeom prst="rect">
+            <a:avLst/>
+          </a:prstGeom>
+        </p:spPr>
+      </p:pic>
+    </p:spTree>
+    <p:extLst>
+      <p:ext uri="{BB962C8B-B14F-4D97-AF65-F5344CB8AC3E}">
+        <p14:creationId xmlns:p14="http://schemas.microsoft.com/office/powerpoint/2010/main" val="3495484266"/>
+      </p:ext>
+    </p:extLst>
+  </p:cSld>
+  <p:clrMapOvr>
+    <a:masterClrMapping/>
+  </p:clrMapOvr>
+  <p:timing>
+    <p:tnLst>
+      <p:par>
+        <p:cTn id="1" dur="indefinite" restart="never" nodeType="tmRoot"/>
+      </p:par>
+    </p:tnLst>
+  </p:timing>
+</p:sld>
+</file>
+
+<file path=ppt/slides/slide7.xml><?xml version="1.0" encoding="utf-8"?>
+<p:sld xmlns:a="http://schemas.openxmlformats.org/drawingml/2006/main" xmlns:r="http://schemas.openxmlformats.org/officeDocument/2006/relationships" xmlns:p="http://schemas.openxmlformats.org/presentationml/2006/main">
+  <p:cSld>
+    <p:spTree>
+      <p:nvGrpSpPr>
+        <p:cNvPr id="1" name=""/>
+        <p:cNvGrpSpPr/>
+        <p:nvPr/>
+      </p:nvGrpSpPr>
+      <p:grpSpPr>
+        <a:xfrm>
+          <a:off x="0" y="0"/>
+          <a:ext cx="0" cy="0"/>
+          <a:chOff x="0" y="0"/>
+          <a:chExt cx="0" cy="0"/>
+        </a:xfrm>
+      </p:grpSpPr>
+      <p:sp>
+        <p:nvSpPr>
+          <p:cNvPr id="2" name="Title 1"/>
+          <p:cNvSpPr>
+            <a:spLocks noGrp="1"/>
+          </p:cNvSpPr>
+          <p:nvPr>
+            <p:ph type="title"/>
+          </p:nvPr>
+        </p:nvSpPr>
+        <p:spPr/>
+        <p:txBody>
+          <a:bodyPr/>
+          <a:lstStyle/>
+          <a:p>
+            <a:r>
+              <a:rPr lang="en-US" dirty="0" smtClean="0"/>
+              <a:t>CUSTOMER SERVICE</a:t>
+            </a:r>
+            <a:endParaRPr lang="en-IN" dirty="0"/>
+          </a:p>
+        </p:txBody>
+      </p:sp>
+      <p:sp>
+        <p:nvSpPr>
+          <p:cNvPr id="3" name="Content Placeholder 2"/>
+          <p:cNvSpPr>
+            <a:spLocks noGrp="1"/>
+          </p:cNvSpPr>
+          <p:nvPr>
+            <p:ph sz="half" idx="1"/>
+          </p:nvPr>
+        </p:nvSpPr>
+        <p:spPr/>
+        <p:txBody>
+          <a:bodyPr/>
+          <a:lstStyle/>
+          <a:p>
+            <a:endParaRPr lang="en-IN"/>
+          </a:p>
+        </p:txBody>
+      </p:sp>
+      <p:sp>
+        <p:nvSpPr>
+          <p:cNvPr id="4" name="Content Placeholder 3"/>
+          <p:cNvSpPr>
+            <a:spLocks noGrp="1"/>
+          </p:cNvSpPr>
+          <p:nvPr>
+            <p:ph sz="half" idx="2"/>
+          </p:nvPr>
+        </p:nvSpPr>
+        <p:spPr/>
+        <p:txBody>
+          <a:bodyPr/>
+          <a:lstStyle/>
+          <a:p>
+            <a:endParaRPr lang="en-IN"/>
+          </a:p>
+        </p:txBody>
+      </p:sp>
+    </p:spTree>
+    <p:extLst>
+      <p:ext uri="{BB962C8B-B14F-4D97-AF65-F5344CB8AC3E}">
+        <p14:creationId xmlns:p14="http://schemas.microsoft.com/office/powerpoint/2010/main" val="2925057377"/>
+      </p:ext>
+    </p:extLst>
+  </p:cSld>
+  <p:clrMapOvr>
+    <a:masterClrMapping/>
+  </p:clrMapOvr>
+  <p:timing>
+    <p:tnLst>
+      <p:par>
+        <p:cTn id="1" dur="indefinite" restart="never" nodeType="tmRoot"/>
+      </p:par>
+    </p:tnLst>
+  </p:timing>
+</p:sld>
+</file>
+
+<file path=ppt/slides/slide8.xml><?xml version="1.0" encoding="utf-8"?>
+<p:sld xmlns:a="http://schemas.openxmlformats.org/drawingml/2006/main" xmlns:r="http://schemas.openxmlformats.org/officeDocument/2006/relationships" xmlns:p="http://schemas.openxmlformats.org/presentationml/2006/main">
+  <p:cSld>
+    <p:spTree>
+      <p:nvGrpSpPr>
+        <p:cNvPr id="1" name=""/>
+        <p:cNvGrpSpPr/>
+        <p:nvPr/>
+      </p:nvGrpSpPr>
+      <p:grpSpPr>
+        <a:xfrm>
+          <a:off x="0" y="0"/>
+          <a:ext cx="0" cy="0"/>
+          <a:chOff x="0" y="0"/>
+          <a:chExt cx="0" cy="0"/>
+        </a:xfrm>
+      </p:grpSpPr>
+      <p:sp>
+        <p:nvSpPr>
+          <p:cNvPr id="2" name="Title 1"/>
+          <p:cNvSpPr>
+            <a:spLocks noGrp="1"/>
+          </p:cNvSpPr>
+          <p:nvPr>
+            <p:ph type="title"/>
+          </p:nvPr>
+        </p:nvSpPr>
+        <p:spPr/>
+        <p:txBody>
+          <a:bodyPr/>
+          <a:lstStyle/>
+          <a:p>
+            <a:r>
+              <a:rPr lang="en-US" dirty="0" smtClean="0"/>
+              <a:t>RESTAURANT SERVICE</a:t>
+            </a:r>
+            <a:endParaRPr lang="en-IN" dirty="0"/>
+          </a:p>
+        </p:txBody>
+      </p:sp>
+      <p:sp>
+        <p:nvSpPr>
+          <p:cNvPr id="3" name="Content Placeholder 2"/>
+          <p:cNvSpPr>
+            <a:spLocks noGrp="1"/>
+          </p:cNvSpPr>
+          <p:nvPr>
+            <p:ph sz="half" idx="1"/>
+          </p:nvPr>
+        </p:nvSpPr>
+        <p:spPr/>
+        <p:txBody>
+          <a:bodyPr/>
+          <a:lstStyle/>
+          <a:p>
+            <a:endParaRPr lang="en-IN"/>
+          </a:p>
+        </p:txBody>
+      </p:sp>
+      <p:sp>
+        <p:nvSpPr>
+          <p:cNvPr id="4" name="Content Placeholder 3"/>
+          <p:cNvSpPr>
+            <a:spLocks noGrp="1"/>
+          </p:cNvSpPr>
+          <p:nvPr>
+            <p:ph sz="half" idx="2"/>
+          </p:nvPr>
+        </p:nvSpPr>
+        <p:spPr/>
+        <p:txBody>
+          <a:bodyPr/>
+          <a:lstStyle/>
+          <a:p>
+            <a:endParaRPr lang="en-IN"/>
+          </a:p>
+        </p:txBody>
+      </p:sp>
+    </p:spTree>
+    <p:extLst>
+      <p:ext uri="{BB962C8B-B14F-4D97-AF65-F5344CB8AC3E}">
+        <p14:creationId xmlns:p14="http://schemas.microsoft.com/office/powerpoint/2010/main" val="1918811738"/>
+      </p:ext>
+    </p:extLst>
+  </p:cSld>
+  <p:clrMapOvr>
+    <a:masterClrMapping/>
+  </p:clrMapOvr>
+  <p:timing>
+    <p:tnLst>
+      <p:par>
+        <p:cTn id="1" dur="indefinite" restart="never" nodeType="tmRoot"/>
+      </p:par>
+    </p:tnLst>
+  </p:timing>
+</p:sld>
+</file>
+
+<file path=ppt/slides/slide9.xml><?xml version="1.0" encoding="utf-8"?>
+<p:sld xmlns:a="http://schemas.openxmlformats.org/drawingml/2006/main" xmlns:r="http://schemas.openxmlformats.org/officeDocument/2006/relationships" xmlns:p="http://schemas.openxmlformats.org/presentationml/2006/main">
+  <p:cSld>
+    <p:spTree>
+      <p:nvGrpSpPr>
+        <p:cNvPr id="1" name=""/>
+        <p:cNvGrpSpPr/>
+        <p:nvPr/>
+      </p:nvGrpSpPr>
+      <p:grpSpPr>
+        <a:xfrm>
+          <a:off x="0" y="0"/>
+          <a:ext cx="0" cy="0"/>
+          <a:chOff x="0" y="0"/>
+          <a:chExt cx="0" cy="0"/>
+        </a:xfrm>
+      </p:grpSpPr>
+      <p:sp>
+        <p:nvSpPr>
+          <p:cNvPr id="2" name="Title 1"/>
+          <p:cNvSpPr>
+            <a:spLocks noGrp="1"/>
+          </p:cNvSpPr>
+          <p:nvPr>
+            <p:ph type="title"/>
+          </p:nvPr>
+        </p:nvSpPr>
+        <p:spPr/>
+        <p:txBody>
+          <a:bodyPr/>
+          <a:lstStyle/>
+          <a:p>
+            <a:r>
+              <a:rPr lang="en-US" dirty="0" smtClean="0"/>
+              <a:t>ORDER SERVICE</a:t>
+            </a:r>
+            <a:endParaRPr lang="en-IN" dirty="0"/>
+          </a:p>
+        </p:txBody>
+      </p:sp>
+      <p:sp>
+        <p:nvSpPr>
+          <p:cNvPr id="3" name="Content Placeholder 2"/>
+          <p:cNvSpPr>
+            <a:spLocks noGrp="1"/>
+          </p:cNvSpPr>
+          <p:nvPr>
+            <p:ph sz="half" idx="1"/>
+          </p:nvPr>
+        </p:nvSpPr>
+        <p:spPr/>
+        <p:txBody>
+          <a:bodyPr/>
+          <a:lstStyle/>
+          <a:p>
+            <a:endParaRPr lang="en-IN"/>
+          </a:p>
+        </p:txBody>
+      </p:sp>
+      <p:sp>
+        <p:nvSpPr>
+          <p:cNvPr id="4" name="Content Placeholder 3"/>
+          <p:cNvSpPr>
+            <a:spLocks noGrp="1"/>
+          </p:cNvSpPr>
+          <p:nvPr>
+            <p:ph sz="half" idx="2"/>
+          </p:nvPr>
+        </p:nvSpPr>
+        <p:spPr/>
+        <p:txBody>
+          <a:bodyPr/>
+          <a:lstStyle/>
+          <a:p>
+            <a:endParaRPr lang="en-IN"/>
+          </a:p>
+        </p:txBody>
+      </p:sp>
+    </p:spTree>
+    <p:extLst>
+      <p:ext uri="{BB962C8B-B14F-4D97-AF65-F5344CB8AC3E}">
+        <p14:creationId xmlns:p14="http://schemas.microsoft.com/office/powerpoint/2010/main" val="3166099006"/>
+      </p:ext>
+    </p:extLst>
+  </p:cSld>
+  <p:clrMapOvr>
+    <a:masterClrMapping/>
+  </p:clrMapOvr>
+  <p:timing>
+    <p:tnLst>
+      <p:par>
+        <p:cTn id="1" dur="indefinite" restart="never" nodeType="tmRoot"/>
+      </p:par>
+    </p:tnLst>
+  </p:timing>
 </p:sld>
 </file>
 
@@ -7530,6 +9478,24 @@
 </file>
 
 <file path=customXml/item1.xml><?xml version="1.0" encoding="utf-8"?>
+<p:properties xmlns:p="http://schemas.microsoft.com/office/2006/metadata/properties" xmlns:xsi="http://www.w3.org/2001/XMLSchema-instance" xmlns:pc="http://schemas.microsoft.com/office/infopath/2007/PartnerControls">
+  <documentManagement>
+    <MediaServiceKeyPoints xmlns="71af3243-3dd4-4a8d-8c0d-dd76da1f02a5" xsi:nil="true"/>
+    <Status xmlns="71af3243-3dd4-4a8d-8c0d-dd76da1f02a5">Not started</Status>
+  </documentManagement>
+</p:properties>
+</file>
+
+<file path=customXml/item2.xml><?xml version="1.0" encoding="utf-8"?>
+<?mso-contentType ?>
+<FormTemplates xmlns="http://schemas.microsoft.com/sharepoint/v3/contenttype/forms">
+  <Display>DocumentLibraryForm</Display>
+  <Edit>DocumentLibraryForm</Edit>
+  <New>DocumentLibraryForm</New>
+</FormTemplates>
+</file>
+
+<file path=customXml/item3.xml><?xml version="1.0" encoding="utf-8"?>
 <ct:contentTypeSchema xmlns:ct="http://schemas.microsoft.com/office/2006/metadata/contentType" xmlns:ma="http://schemas.microsoft.com/office/2006/metadata/properties/metaAttributes" ct:_="" ma:_="" ma:contentTypeName="Document" ma:contentTypeID="0x01010079F111ED35F8CC479449609E8A0923A6" ma:contentTypeVersion="12" ma:contentTypeDescription="Create a new document." ma:contentTypeScope="" ma:versionID="b385d60f68dd989dca1fdc827799d853">
   <xsd:schema xmlns:xsd="http://www.w3.org/2001/XMLSchema" xmlns:xs="http://www.w3.org/2001/XMLSchema" xmlns:p="http://schemas.microsoft.com/office/2006/metadata/properties" xmlns:ns2="71af3243-3dd4-4a8d-8c0d-dd76da1f02a5" xmlns:ns3="16c05727-aa75-4e4a-9b5f-8a80a1165891" targetNamespace="http://schemas.microsoft.com/office/2006/metadata/properties" ma:root="true" ma:fieldsID="1911b479caf7b199da365455750e4572" ns2:_="" ns3:_="">
     <xsd:import namespace="71af3243-3dd4-4a8d-8c0d-dd76da1f02a5"/>
@@ -7750,25 +9716,32 @@
 </ct:contentTypeSchema>
 </file>
 
-<file path=customXml/item2.xml><?xml version="1.0" encoding="utf-8"?>
-<?mso-contentType ?>
-<FormTemplates xmlns="http://schemas.microsoft.com/sharepoint/v3/contenttype/forms">
-  <Display>DocumentLibraryForm</Display>
-  <Edit>DocumentLibraryForm</Edit>
-  <New>DocumentLibraryForm</New>
-</FormTemplates>
+<file path=customXml/itemProps1.xml><?xml version="1.0" encoding="utf-8"?>
+<ds:datastoreItem xmlns:ds="http://schemas.openxmlformats.org/officeDocument/2006/customXml" ds:itemID="{69E38AEF-4E2D-4D00-9707-4356DDB77317}">
+  <ds:schemaRefs>
+    <ds:schemaRef ds:uri="http://schemas.microsoft.com/office/2006/metadata/properties"/>
+    <ds:schemaRef ds:uri="71af3243-3dd4-4a8d-8c0d-dd76da1f02a5"/>
+    <ds:schemaRef ds:uri="http://www.w3.org/XML/1998/namespace"/>
+    <ds:schemaRef ds:uri="http://schemas.microsoft.com/office/2006/documentManagement/types"/>
+    <ds:schemaRef ds:uri="16c05727-aa75-4e4a-9b5f-8a80a1165891"/>
+    <ds:schemaRef ds:uri="http://purl.org/dc/terms/"/>
+    <ds:schemaRef ds:uri="http://schemas.microsoft.com/office/infopath/2007/PartnerControls"/>
+    <ds:schemaRef ds:uri="http://schemas.openxmlformats.org/package/2006/metadata/core-properties"/>
+    <ds:schemaRef ds:uri="http://purl.org/dc/dcmitype/"/>
+    <ds:schemaRef ds:uri="http://purl.org/dc/elements/1.1/"/>
+  </ds:schemaRefs>
+</ds:datastoreItem>
 </file>
 
-<file path=customXml/item3.xml><?xml version="1.0" encoding="utf-8"?>
-<p:properties xmlns:p="http://schemas.microsoft.com/office/2006/metadata/properties" xmlns:xsi="http://www.w3.org/2001/XMLSchema-instance" xmlns:pc="http://schemas.microsoft.com/office/infopath/2007/PartnerControls">
-  <documentManagement>
-    <MediaServiceKeyPoints xmlns="71af3243-3dd4-4a8d-8c0d-dd76da1f02a5" xsi:nil="true"/>
-    <Status xmlns="71af3243-3dd4-4a8d-8c0d-dd76da1f02a5">Not started</Status>
-  </documentManagement>
-</p:properties>
+<file path=customXml/itemProps2.xml><?xml version="1.0" encoding="utf-8"?>
+<ds:datastoreItem xmlns:ds="http://schemas.openxmlformats.org/officeDocument/2006/customXml" ds:itemID="{E7235C91-959C-45D9-B60A-005B894ACEE3}">
+  <ds:schemaRefs>
+    <ds:schemaRef ds:uri="http://schemas.microsoft.com/sharepoint/v3/contenttype/forms"/>
+  </ds:schemaRefs>
+</ds:datastoreItem>
 </file>
 
-<file path=customXml/itemProps1.xml><?xml version="1.0" encoding="utf-8"?>
+<file path=customXml/itemProps3.xml><?xml version="1.0" encoding="utf-8"?>
 <ds:datastoreItem xmlns:ds="http://schemas.openxmlformats.org/officeDocument/2006/customXml" ds:itemID="{1EF06AFC-006B-4BB6-8B59-5A9E1B0534F1}">
   <ds:schemaRefs>
     <ds:schemaRef ds:uri="http://schemas.microsoft.com/office/2006/metadata/contentType"/>
@@ -7785,29 +9758,4 @@
     <ds:schemaRef ds:uri="http://schemas.microsoft.com/internal/obd"/>
   </ds:schemaRefs>
 </ds:datastoreItem>
-</file>
-
-<file path=customXml/itemProps2.xml><?xml version="1.0" encoding="utf-8"?>
-<ds:datastoreItem xmlns:ds="http://schemas.openxmlformats.org/officeDocument/2006/customXml" ds:itemID="{E7235C91-959C-45D9-B60A-005B894ACEE3}">
-  <ds:schemaRefs>
-    <ds:schemaRef ds:uri="http://schemas.microsoft.com/sharepoint/v3/contenttype/forms"/>
-  </ds:schemaRefs>
-</ds:datastoreItem>
-</file>
-
-<file path=customXml/itemProps3.xml><?xml version="1.0" encoding="utf-8"?>
-<ds:datastoreItem xmlns:ds="http://schemas.openxmlformats.org/officeDocument/2006/customXml" ds:itemID="{69E38AEF-4E2D-4D00-9707-4356DDB77317}">
-  <ds:schemaRefs>
-    <ds:schemaRef ds:uri="http://purl.org/dc/terms/"/>
-    <ds:schemaRef ds:uri="71af3243-3dd4-4a8d-8c0d-dd76da1f02a5"/>
-    <ds:schemaRef ds:uri="16c05727-aa75-4e4a-9b5f-8a80a1165891"/>
-    <ds:schemaRef ds:uri="http://www.w3.org/XML/1998/namespace"/>
-    <ds:schemaRef ds:uri="http://schemas.microsoft.com/office/2006/documentManagement/types"/>
-    <ds:schemaRef ds:uri="http://schemas.microsoft.com/office/2006/metadata/properties"/>
-    <ds:schemaRef ds:uri="http://schemas.microsoft.com/office/infopath/2007/PartnerControls"/>
-    <ds:schemaRef ds:uri="http://purl.org/dc/dcmitype/"/>
-    <ds:schemaRef ds:uri="http://schemas.openxmlformats.org/package/2006/metadata/core-properties"/>
-    <ds:schemaRef ds:uri="http://purl.org/dc/elements/1.1/"/>
-  </ds:schemaRefs>
-</ds:datastoreItem>
 </file>
</xml_diff>